<commit_message>
write record attribute values
</commit_message>
<xml_diff>
--- a/etc/Microbat Design for Trace Storage.pptx
+++ b/etc/Microbat Design for Trace Storage.pptx
@@ -11,12 +11,13 @@
     <p:sldId id="267" r:id="rId5"/>
     <p:sldId id="265" r:id="rId6"/>
     <p:sldId id="268" r:id="rId7"/>
-    <p:sldId id="258" r:id="rId8"/>
-    <p:sldId id="259" r:id="rId9"/>
-    <p:sldId id="260" r:id="rId10"/>
-    <p:sldId id="261" r:id="rId11"/>
-    <p:sldId id="262" r:id="rId12"/>
-    <p:sldId id="263" r:id="rId13"/>
+    <p:sldId id="269" r:id="rId8"/>
+    <p:sldId id="258" r:id="rId9"/>
+    <p:sldId id="259" r:id="rId10"/>
+    <p:sldId id="260" r:id="rId11"/>
+    <p:sldId id="261" r:id="rId12"/>
+    <p:sldId id="262" r:id="rId13"/>
+    <p:sldId id="263" r:id="rId14"/>
   </p:sldIdLst>
   <p:sldSz cx="12192000" cy="6858000"/>
   <p:notesSz cx="6858000" cy="9144000"/>
@@ -140,7 +141,7 @@
           <p:cNvPr id="2" name="Title 1">
             <a:extLst>
               <a:ext uri="{FF2B5EF4-FFF2-40B4-BE49-F238E27FC236}">
-                <a16:creationId xmlns:a16="http://schemas.microsoft.com/office/drawing/2014/main" xmlns="" id="{00802045-A1DE-4CDA-87F0-12BCEF7F64EA}"/>
+                <a16:creationId xmlns="" xmlns:a16="http://schemas.microsoft.com/office/drawing/2014/main" id="{00802045-A1DE-4CDA-87F0-12BCEF7F64EA}"/>
               </a:ext>
             </a:extLst>
           </p:cNvPr>
@@ -177,7 +178,7 @@
           <p:cNvPr id="3" name="Subtitle 2">
             <a:extLst>
               <a:ext uri="{FF2B5EF4-FFF2-40B4-BE49-F238E27FC236}">
-                <a16:creationId xmlns:a16="http://schemas.microsoft.com/office/drawing/2014/main" xmlns="" id="{F2DD4DA3-3DCD-4852-9C96-CC215F64AC2C}"/>
+                <a16:creationId xmlns="" xmlns:a16="http://schemas.microsoft.com/office/drawing/2014/main" id="{F2DD4DA3-3DCD-4852-9C96-CC215F64AC2C}"/>
               </a:ext>
             </a:extLst>
           </p:cNvPr>
@@ -247,7 +248,7 @@
           <p:cNvPr id="4" name="Date Placeholder 3">
             <a:extLst>
               <a:ext uri="{FF2B5EF4-FFF2-40B4-BE49-F238E27FC236}">
-                <a16:creationId xmlns:a16="http://schemas.microsoft.com/office/drawing/2014/main" xmlns="" id="{11152C3B-634A-48D2-B6DF-5596A028CAA0}"/>
+                <a16:creationId xmlns="" xmlns:a16="http://schemas.microsoft.com/office/drawing/2014/main" id="{11152C3B-634A-48D2-B6DF-5596A028CAA0}"/>
               </a:ext>
             </a:extLst>
           </p:cNvPr>
@@ -265,7 +266,7 @@
           <a:p>
             <a:fld id="{98721B90-EA1F-4164-9F70-3DC63C567694}" type="datetimeFigureOut">
               <a:rPr lang="en-US" smtClean="0"/>
-              <a:t>7/25/2020</a:t>
+              <a:t>8/4/2020</a:t>
             </a:fld>
             <a:endParaRPr lang="en-US"/>
           </a:p>
@@ -276,7 +277,7 @@
           <p:cNvPr id="5" name="Footer Placeholder 4">
             <a:extLst>
               <a:ext uri="{FF2B5EF4-FFF2-40B4-BE49-F238E27FC236}">
-                <a16:creationId xmlns:a16="http://schemas.microsoft.com/office/drawing/2014/main" xmlns="" id="{79308A7B-55F7-4229-BC1F-DABDBDFCF0B1}"/>
+                <a16:creationId xmlns="" xmlns:a16="http://schemas.microsoft.com/office/drawing/2014/main" id="{79308A7B-55F7-4229-BC1F-DABDBDFCF0B1}"/>
               </a:ext>
             </a:extLst>
           </p:cNvPr>
@@ -301,7 +302,7 @@
           <p:cNvPr id="6" name="Slide Number Placeholder 5">
             <a:extLst>
               <a:ext uri="{FF2B5EF4-FFF2-40B4-BE49-F238E27FC236}">
-                <a16:creationId xmlns:a16="http://schemas.microsoft.com/office/drawing/2014/main" xmlns="" id="{B24CA24E-49EE-4932-ABFA-E8491C2018EB}"/>
+                <a16:creationId xmlns="" xmlns:a16="http://schemas.microsoft.com/office/drawing/2014/main" id="{B24CA24E-49EE-4932-ABFA-E8491C2018EB}"/>
               </a:ext>
             </a:extLst>
           </p:cNvPr>
@@ -360,7 +361,7 @@
           <p:cNvPr id="2" name="Title 1">
             <a:extLst>
               <a:ext uri="{FF2B5EF4-FFF2-40B4-BE49-F238E27FC236}">
-                <a16:creationId xmlns:a16="http://schemas.microsoft.com/office/drawing/2014/main" xmlns="" id="{93EFFE67-8288-45C8-82C8-AA331CD4BE94}"/>
+                <a16:creationId xmlns="" xmlns:a16="http://schemas.microsoft.com/office/drawing/2014/main" id="{93EFFE67-8288-45C8-82C8-AA331CD4BE94}"/>
               </a:ext>
             </a:extLst>
           </p:cNvPr>
@@ -388,7 +389,7 @@
           <p:cNvPr id="3" name="Vertical Text Placeholder 2">
             <a:extLst>
               <a:ext uri="{FF2B5EF4-FFF2-40B4-BE49-F238E27FC236}">
-                <a16:creationId xmlns:a16="http://schemas.microsoft.com/office/drawing/2014/main" xmlns="" id="{20F16110-122C-4E45-B4EC-D36E47C1D4EC}"/>
+                <a16:creationId xmlns="" xmlns:a16="http://schemas.microsoft.com/office/drawing/2014/main" id="{20F16110-122C-4E45-B4EC-D36E47C1D4EC}"/>
               </a:ext>
             </a:extLst>
           </p:cNvPr>
@@ -445,7 +446,7 @@
           <p:cNvPr id="4" name="Date Placeholder 3">
             <a:extLst>
               <a:ext uri="{FF2B5EF4-FFF2-40B4-BE49-F238E27FC236}">
-                <a16:creationId xmlns:a16="http://schemas.microsoft.com/office/drawing/2014/main" xmlns="" id="{FABCBC66-3E15-4A1C-A412-19F994EF945F}"/>
+                <a16:creationId xmlns="" xmlns:a16="http://schemas.microsoft.com/office/drawing/2014/main" id="{FABCBC66-3E15-4A1C-A412-19F994EF945F}"/>
               </a:ext>
             </a:extLst>
           </p:cNvPr>
@@ -463,7 +464,7 @@
           <a:p>
             <a:fld id="{98721B90-EA1F-4164-9F70-3DC63C567694}" type="datetimeFigureOut">
               <a:rPr lang="en-US" smtClean="0"/>
-              <a:t>7/25/2020</a:t>
+              <a:t>8/4/2020</a:t>
             </a:fld>
             <a:endParaRPr lang="en-US"/>
           </a:p>
@@ -474,7 +475,7 @@
           <p:cNvPr id="5" name="Footer Placeholder 4">
             <a:extLst>
               <a:ext uri="{FF2B5EF4-FFF2-40B4-BE49-F238E27FC236}">
-                <a16:creationId xmlns:a16="http://schemas.microsoft.com/office/drawing/2014/main" xmlns="" id="{1A86EDFC-EFA9-4073-A878-E3B11E55537C}"/>
+                <a16:creationId xmlns="" xmlns:a16="http://schemas.microsoft.com/office/drawing/2014/main" id="{1A86EDFC-EFA9-4073-A878-E3B11E55537C}"/>
               </a:ext>
             </a:extLst>
           </p:cNvPr>
@@ -499,7 +500,7 @@
           <p:cNvPr id="6" name="Slide Number Placeholder 5">
             <a:extLst>
               <a:ext uri="{FF2B5EF4-FFF2-40B4-BE49-F238E27FC236}">
-                <a16:creationId xmlns:a16="http://schemas.microsoft.com/office/drawing/2014/main" xmlns="" id="{16F4C5EE-7C05-4BA6-B2BE-740A6154EDB5}"/>
+                <a16:creationId xmlns="" xmlns:a16="http://schemas.microsoft.com/office/drawing/2014/main" id="{16F4C5EE-7C05-4BA6-B2BE-740A6154EDB5}"/>
               </a:ext>
             </a:extLst>
           </p:cNvPr>
@@ -558,7 +559,7 @@
           <p:cNvPr id="2" name="Vertical Title 1">
             <a:extLst>
               <a:ext uri="{FF2B5EF4-FFF2-40B4-BE49-F238E27FC236}">
-                <a16:creationId xmlns:a16="http://schemas.microsoft.com/office/drawing/2014/main" xmlns="" id="{4B20CCDF-3EB6-4E8F-A109-73DBE5DBB9FF}"/>
+                <a16:creationId xmlns="" xmlns:a16="http://schemas.microsoft.com/office/drawing/2014/main" id="{4B20CCDF-3EB6-4E8F-A109-73DBE5DBB9FF}"/>
               </a:ext>
             </a:extLst>
           </p:cNvPr>
@@ -591,7 +592,7 @@
           <p:cNvPr id="3" name="Vertical Text Placeholder 2">
             <a:extLst>
               <a:ext uri="{FF2B5EF4-FFF2-40B4-BE49-F238E27FC236}">
-                <a16:creationId xmlns:a16="http://schemas.microsoft.com/office/drawing/2014/main" xmlns="" id="{E658D0CC-AE4B-4DD6-9F10-1A21B6EBC301}"/>
+                <a16:creationId xmlns="" xmlns:a16="http://schemas.microsoft.com/office/drawing/2014/main" id="{E658D0CC-AE4B-4DD6-9F10-1A21B6EBC301}"/>
               </a:ext>
             </a:extLst>
           </p:cNvPr>
@@ -653,7 +654,7 @@
           <p:cNvPr id="4" name="Date Placeholder 3">
             <a:extLst>
               <a:ext uri="{FF2B5EF4-FFF2-40B4-BE49-F238E27FC236}">
-                <a16:creationId xmlns:a16="http://schemas.microsoft.com/office/drawing/2014/main" xmlns="" id="{046D18A2-6E3F-4E51-BDCE-427FE957BA73}"/>
+                <a16:creationId xmlns="" xmlns:a16="http://schemas.microsoft.com/office/drawing/2014/main" id="{046D18A2-6E3F-4E51-BDCE-427FE957BA73}"/>
               </a:ext>
             </a:extLst>
           </p:cNvPr>
@@ -671,7 +672,7 @@
           <a:p>
             <a:fld id="{98721B90-EA1F-4164-9F70-3DC63C567694}" type="datetimeFigureOut">
               <a:rPr lang="en-US" smtClean="0"/>
-              <a:t>7/25/2020</a:t>
+              <a:t>8/4/2020</a:t>
             </a:fld>
             <a:endParaRPr lang="en-US"/>
           </a:p>
@@ -682,7 +683,7 @@
           <p:cNvPr id="5" name="Footer Placeholder 4">
             <a:extLst>
               <a:ext uri="{FF2B5EF4-FFF2-40B4-BE49-F238E27FC236}">
-                <a16:creationId xmlns:a16="http://schemas.microsoft.com/office/drawing/2014/main" xmlns="" id="{B24B1093-61F2-4162-B5C9-B1834AFC4080}"/>
+                <a16:creationId xmlns="" xmlns:a16="http://schemas.microsoft.com/office/drawing/2014/main" id="{B24B1093-61F2-4162-B5C9-B1834AFC4080}"/>
               </a:ext>
             </a:extLst>
           </p:cNvPr>
@@ -707,7 +708,7 @@
           <p:cNvPr id="6" name="Slide Number Placeholder 5">
             <a:extLst>
               <a:ext uri="{FF2B5EF4-FFF2-40B4-BE49-F238E27FC236}">
-                <a16:creationId xmlns:a16="http://schemas.microsoft.com/office/drawing/2014/main" xmlns="" id="{3372C2E7-DA5F-476F-8484-AD2BF46F27DE}"/>
+                <a16:creationId xmlns="" xmlns:a16="http://schemas.microsoft.com/office/drawing/2014/main" id="{3372C2E7-DA5F-476F-8484-AD2BF46F27DE}"/>
               </a:ext>
             </a:extLst>
           </p:cNvPr>
@@ -766,7 +767,7 @@
           <p:cNvPr id="2" name="Title 1">
             <a:extLst>
               <a:ext uri="{FF2B5EF4-FFF2-40B4-BE49-F238E27FC236}">
-                <a16:creationId xmlns:a16="http://schemas.microsoft.com/office/drawing/2014/main" xmlns="" id="{D2586A5F-142A-43F1-B362-25F21C41EA22}"/>
+                <a16:creationId xmlns="" xmlns:a16="http://schemas.microsoft.com/office/drawing/2014/main" id="{D2586A5F-142A-43F1-B362-25F21C41EA22}"/>
               </a:ext>
             </a:extLst>
           </p:cNvPr>
@@ -794,7 +795,7 @@
           <p:cNvPr id="3" name="Content Placeholder 2">
             <a:extLst>
               <a:ext uri="{FF2B5EF4-FFF2-40B4-BE49-F238E27FC236}">
-                <a16:creationId xmlns:a16="http://schemas.microsoft.com/office/drawing/2014/main" xmlns="" id="{57CA4218-5F43-42E1-969D-256A6C1B4992}"/>
+                <a16:creationId xmlns="" xmlns:a16="http://schemas.microsoft.com/office/drawing/2014/main" id="{57CA4218-5F43-42E1-969D-256A6C1B4992}"/>
               </a:ext>
             </a:extLst>
           </p:cNvPr>
@@ -851,7 +852,7 @@
           <p:cNvPr id="4" name="Date Placeholder 3">
             <a:extLst>
               <a:ext uri="{FF2B5EF4-FFF2-40B4-BE49-F238E27FC236}">
-                <a16:creationId xmlns:a16="http://schemas.microsoft.com/office/drawing/2014/main" xmlns="" id="{DFC4C97E-AC9D-4EBE-B21E-ED505F7CCF24}"/>
+                <a16:creationId xmlns="" xmlns:a16="http://schemas.microsoft.com/office/drawing/2014/main" id="{DFC4C97E-AC9D-4EBE-B21E-ED505F7CCF24}"/>
               </a:ext>
             </a:extLst>
           </p:cNvPr>
@@ -869,7 +870,7 @@
           <a:p>
             <a:fld id="{98721B90-EA1F-4164-9F70-3DC63C567694}" type="datetimeFigureOut">
               <a:rPr lang="en-US" smtClean="0"/>
-              <a:t>7/25/2020</a:t>
+              <a:t>8/4/2020</a:t>
             </a:fld>
             <a:endParaRPr lang="en-US"/>
           </a:p>
@@ -880,7 +881,7 @@
           <p:cNvPr id="5" name="Footer Placeholder 4">
             <a:extLst>
               <a:ext uri="{FF2B5EF4-FFF2-40B4-BE49-F238E27FC236}">
-                <a16:creationId xmlns:a16="http://schemas.microsoft.com/office/drawing/2014/main" xmlns="" id="{DAA1A8E5-F4FA-4F85-906D-BC344585FDDD}"/>
+                <a16:creationId xmlns="" xmlns:a16="http://schemas.microsoft.com/office/drawing/2014/main" id="{DAA1A8E5-F4FA-4F85-906D-BC344585FDDD}"/>
               </a:ext>
             </a:extLst>
           </p:cNvPr>
@@ -905,7 +906,7 @@
           <p:cNvPr id="6" name="Slide Number Placeholder 5">
             <a:extLst>
               <a:ext uri="{FF2B5EF4-FFF2-40B4-BE49-F238E27FC236}">
-                <a16:creationId xmlns:a16="http://schemas.microsoft.com/office/drawing/2014/main" xmlns="" id="{062DB39F-B273-40CD-A187-3AE49EAE98D1}"/>
+                <a16:creationId xmlns="" xmlns:a16="http://schemas.microsoft.com/office/drawing/2014/main" id="{062DB39F-B273-40CD-A187-3AE49EAE98D1}"/>
               </a:ext>
             </a:extLst>
           </p:cNvPr>
@@ -964,7 +965,7 @@
           <p:cNvPr id="2" name="Title 1">
             <a:extLst>
               <a:ext uri="{FF2B5EF4-FFF2-40B4-BE49-F238E27FC236}">
-                <a16:creationId xmlns:a16="http://schemas.microsoft.com/office/drawing/2014/main" xmlns="" id="{8B8F6BCE-4485-4E3F-9E08-807EDADCD82D}"/>
+                <a16:creationId xmlns="" xmlns:a16="http://schemas.microsoft.com/office/drawing/2014/main" id="{8B8F6BCE-4485-4E3F-9E08-807EDADCD82D}"/>
               </a:ext>
             </a:extLst>
           </p:cNvPr>
@@ -1001,7 +1002,7 @@
           <p:cNvPr id="3" name="Text Placeholder 2">
             <a:extLst>
               <a:ext uri="{FF2B5EF4-FFF2-40B4-BE49-F238E27FC236}">
-                <a16:creationId xmlns:a16="http://schemas.microsoft.com/office/drawing/2014/main" xmlns="" id="{AEA9A362-4BE6-4A00-B9EB-6BD235439CD0}"/>
+                <a16:creationId xmlns="" xmlns:a16="http://schemas.microsoft.com/office/drawing/2014/main" id="{AEA9A362-4BE6-4A00-B9EB-6BD235439CD0}"/>
               </a:ext>
             </a:extLst>
           </p:cNvPr>
@@ -1126,7 +1127,7 @@
           <p:cNvPr id="4" name="Date Placeholder 3">
             <a:extLst>
               <a:ext uri="{FF2B5EF4-FFF2-40B4-BE49-F238E27FC236}">
-                <a16:creationId xmlns:a16="http://schemas.microsoft.com/office/drawing/2014/main" xmlns="" id="{44A9D58A-9F76-43E7-8576-4FE14D23392F}"/>
+                <a16:creationId xmlns="" xmlns:a16="http://schemas.microsoft.com/office/drawing/2014/main" id="{44A9D58A-9F76-43E7-8576-4FE14D23392F}"/>
               </a:ext>
             </a:extLst>
           </p:cNvPr>
@@ -1144,7 +1145,7 @@
           <a:p>
             <a:fld id="{98721B90-EA1F-4164-9F70-3DC63C567694}" type="datetimeFigureOut">
               <a:rPr lang="en-US" smtClean="0"/>
-              <a:t>7/25/2020</a:t>
+              <a:t>8/4/2020</a:t>
             </a:fld>
             <a:endParaRPr lang="en-US"/>
           </a:p>
@@ -1155,7 +1156,7 @@
           <p:cNvPr id="5" name="Footer Placeholder 4">
             <a:extLst>
               <a:ext uri="{FF2B5EF4-FFF2-40B4-BE49-F238E27FC236}">
-                <a16:creationId xmlns:a16="http://schemas.microsoft.com/office/drawing/2014/main" xmlns="" id="{59DBFA34-4CE4-4192-BAD0-B2CF1E3C79FC}"/>
+                <a16:creationId xmlns="" xmlns:a16="http://schemas.microsoft.com/office/drawing/2014/main" id="{59DBFA34-4CE4-4192-BAD0-B2CF1E3C79FC}"/>
               </a:ext>
             </a:extLst>
           </p:cNvPr>
@@ -1180,7 +1181,7 @@
           <p:cNvPr id="6" name="Slide Number Placeholder 5">
             <a:extLst>
               <a:ext uri="{FF2B5EF4-FFF2-40B4-BE49-F238E27FC236}">
-                <a16:creationId xmlns:a16="http://schemas.microsoft.com/office/drawing/2014/main" xmlns="" id="{174F47B2-436D-44BA-A1B9-CB4A7CA83773}"/>
+                <a16:creationId xmlns="" xmlns:a16="http://schemas.microsoft.com/office/drawing/2014/main" id="{174F47B2-436D-44BA-A1B9-CB4A7CA83773}"/>
               </a:ext>
             </a:extLst>
           </p:cNvPr>
@@ -1239,7 +1240,7 @@
           <p:cNvPr id="2" name="Title 1">
             <a:extLst>
               <a:ext uri="{FF2B5EF4-FFF2-40B4-BE49-F238E27FC236}">
-                <a16:creationId xmlns:a16="http://schemas.microsoft.com/office/drawing/2014/main" xmlns="" id="{209CE975-4C4F-4636-83DA-FBB305A6709F}"/>
+                <a16:creationId xmlns="" xmlns:a16="http://schemas.microsoft.com/office/drawing/2014/main" id="{209CE975-4C4F-4636-83DA-FBB305A6709F}"/>
               </a:ext>
             </a:extLst>
           </p:cNvPr>
@@ -1267,7 +1268,7 @@
           <p:cNvPr id="3" name="Content Placeholder 2">
             <a:extLst>
               <a:ext uri="{FF2B5EF4-FFF2-40B4-BE49-F238E27FC236}">
-                <a16:creationId xmlns:a16="http://schemas.microsoft.com/office/drawing/2014/main" xmlns="" id="{748ED7E4-95D8-45F9-A98F-739238B42883}"/>
+                <a16:creationId xmlns="" xmlns:a16="http://schemas.microsoft.com/office/drawing/2014/main" id="{748ED7E4-95D8-45F9-A98F-739238B42883}"/>
               </a:ext>
             </a:extLst>
           </p:cNvPr>
@@ -1329,7 +1330,7 @@
           <p:cNvPr id="4" name="Content Placeholder 3">
             <a:extLst>
               <a:ext uri="{FF2B5EF4-FFF2-40B4-BE49-F238E27FC236}">
-                <a16:creationId xmlns:a16="http://schemas.microsoft.com/office/drawing/2014/main" xmlns="" id="{071E4969-66D6-4DEA-838A-45A6B5907A48}"/>
+                <a16:creationId xmlns="" xmlns:a16="http://schemas.microsoft.com/office/drawing/2014/main" id="{071E4969-66D6-4DEA-838A-45A6B5907A48}"/>
               </a:ext>
             </a:extLst>
           </p:cNvPr>
@@ -1391,7 +1392,7 @@
           <p:cNvPr id="5" name="Date Placeholder 4">
             <a:extLst>
               <a:ext uri="{FF2B5EF4-FFF2-40B4-BE49-F238E27FC236}">
-                <a16:creationId xmlns:a16="http://schemas.microsoft.com/office/drawing/2014/main" xmlns="" id="{05CE8E8C-ED65-427C-848B-C7A2042DC571}"/>
+                <a16:creationId xmlns="" xmlns:a16="http://schemas.microsoft.com/office/drawing/2014/main" id="{05CE8E8C-ED65-427C-848B-C7A2042DC571}"/>
               </a:ext>
             </a:extLst>
           </p:cNvPr>
@@ -1409,7 +1410,7 @@
           <a:p>
             <a:fld id="{98721B90-EA1F-4164-9F70-3DC63C567694}" type="datetimeFigureOut">
               <a:rPr lang="en-US" smtClean="0"/>
-              <a:t>7/25/2020</a:t>
+              <a:t>8/4/2020</a:t>
             </a:fld>
             <a:endParaRPr lang="en-US"/>
           </a:p>
@@ -1420,7 +1421,7 @@
           <p:cNvPr id="6" name="Footer Placeholder 5">
             <a:extLst>
               <a:ext uri="{FF2B5EF4-FFF2-40B4-BE49-F238E27FC236}">
-                <a16:creationId xmlns:a16="http://schemas.microsoft.com/office/drawing/2014/main" xmlns="" id="{02FC0DA0-0F2C-4E15-BEA0-111ABAC67023}"/>
+                <a16:creationId xmlns="" xmlns:a16="http://schemas.microsoft.com/office/drawing/2014/main" id="{02FC0DA0-0F2C-4E15-BEA0-111ABAC67023}"/>
               </a:ext>
             </a:extLst>
           </p:cNvPr>
@@ -1445,7 +1446,7 @@
           <p:cNvPr id="7" name="Slide Number Placeholder 6">
             <a:extLst>
               <a:ext uri="{FF2B5EF4-FFF2-40B4-BE49-F238E27FC236}">
-                <a16:creationId xmlns:a16="http://schemas.microsoft.com/office/drawing/2014/main" xmlns="" id="{55175AF4-6F5C-4DA1-81BF-055F41B03CD0}"/>
+                <a16:creationId xmlns="" xmlns:a16="http://schemas.microsoft.com/office/drawing/2014/main" id="{55175AF4-6F5C-4DA1-81BF-055F41B03CD0}"/>
               </a:ext>
             </a:extLst>
           </p:cNvPr>
@@ -1504,7 +1505,7 @@
           <p:cNvPr id="2" name="Title 1">
             <a:extLst>
               <a:ext uri="{FF2B5EF4-FFF2-40B4-BE49-F238E27FC236}">
-                <a16:creationId xmlns:a16="http://schemas.microsoft.com/office/drawing/2014/main" xmlns="" id="{0CFE13B7-ED31-4F1B-9A75-D2CBCB791007}"/>
+                <a16:creationId xmlns="" xmlns:a16="http://schemas.microsoft.com/office/drawing/2014/main" id="{0CFE13B7-ED31-4F1B-9A75-D2CBCB791007}"/>
               </a:ext>
             </a:extLst>
           </p:cNvPr>
@@ -1537,7 +1538,7 @@
           <p:cNvPr id="3" name="Text Placeholder 2">
             <a:extLst>
               <a:ext uri="{FF2B5EF4-FFF2-40B4-BE49-F238E27FC236}">
-                <a16:creationId xmlns:a16="http://schemas.microsoft.com/office/drawing/2014/main" xmlns="" id="{77468C93-F011-404A-BEB3-8C113F941B96}"/>
+                <a16:creationId xmlns="" xmlns:a16="http://schemas.microsoft.com/office/drawing/2014/main" id="{77468C93-F011-404A-BEB3-8C113F941B96}"/>
               </a:ext>
             </a:extLst>
           </p:cNvPr>
@@ -1608,7 +1609,7 @@
           <p:cNvPr id="4" name="Content Placeholder 3">
             <a:extLst>
               <a:ext uri="{FF2B5EF4-FFF2-40B4-BE49-F238E27FC236}">
-                <a16:creationId xmlns:a16="http://schemas.microsoft.com/office/drawing/2014/main" xmlns="" id="{05BDAC80-2836-40DA-A33E-2C7AF754BD85}"/>
+                <a16:creationId xmlns="" xmlns:a16="http://schemas.microsoft.com/office/drawing/2014/main" id="{05BDAC80-2836-40DA-A33E-2C7AF754BD85}"/>
               </a:ext>
             </a:extLst>
           </p:cNvPr>
@@ -1670,7 +1671,7 @@
           <p:cNvPr id="5" name="Text Placeholder 4">
             <a:extLst>
               <a:ext uri="{FF2B5EF4-FFF2-40B4-BE49-F238E27FC236}">
-                <a16:creationId xmlns:a16="http://schemas.microsoft.com/office/drawing/2014/main" xmlns="" id="{0CE1BE67-846E-4CB4-9B35-A71C930AF1DD}"/>
+                <a16:creationId xmlns="" xmlns:a16="http://schemas.microsoft.com/office/drawing/2014/main" id="{0CE1BE67-846E-4CB4-9B35-A71C930AF1DD}"/>
               </a:ext>
             </a:extLst>
           </p:cNvPr>
@@ -1741,7 +1742,7 @@
           <p:cNvPr id="6" name="Content Placeholder 5">
             <a:extLst>
               <a:ext uri="{FF2B5EF4-FFF2-40B4-BE49-F238E27FC236}">
-                <a16:creationId xmlns:a16="http://schemas.microsoft.com/office/drawing/2014/main" xmlns="" id="{DD55E3F7-2248-45FE-B764-597D5AE4D9A6}"/>
+                <a16:creationId xmlns="" xmlns:a16="http://schemas.microsoft.com/office/drawing/2014/main" id="{DD55E3F7-2248-45FE-B764-597D5AE4D9A6}"/>
               </a:ext>
             </a:extLst>
           </p:cNvPr>
@@ -1803,7 +1804,7 @@
           <p:cNvPr id="7" name="Date Placeholder 6">
             <a:extLst>
               <a:ext uri="{FF2B5EF4-FFF2-40B4-BE49-F238E27FC236}">
-                <a16:creationId xmlns:a16="http://schemas.microsoft.com/office/drawing/2014/main" xmlns="" id="{1C5DED99-6D6E-4A58-AFE7-4663BF0CA280}"/>
+                <a16:creationId xmlns="" xmlns:a16="http://schemas.microsoft.com/office/drawing/2014/main" id="{1C5DED99-6D6E-4A58-AFE7-4663BF0CA280}"/>
               </a:ext>
             </a:extLst>
           </p:cNvPr>
@@ -1821,7 +1822,7 @@
           <a:p>
             <a:fld id="{98721B90-EA1F-4164-9F70-3DC63C567694}" type="datetimeFigureOut">
               <a:rPr lang="en-US" smtClean="0"/>
-              <a:t>7/25/2020</a:t>
+              <a:t>8/4/2020</a:t>
             </a:fld>
             <a:endParaRPr lang="en-US"/>
           </a:p>
@@ -1832,7 +1833,7 @@
           <p:cNvPr id="8" name="Footer Placeholder 7">
             <a:extLst>
               <a:ext uri="{FF2B5EF4-FFF2-40B4-BE49-F238E27FC236}">
-                <a16:creationId xmlns:a16="http://schemas.microsoft.com/office/drawing/2014/main" xmlns="" id="{6FF79411-2211-4BA9-A90B-D1CDB0D71FC4}"/>
+                <a16:creationId xmlns="" xmlns:a16="http://schemas.microsoft.com/office/drawing/2014/main" id="{6FF79411-2211-4BA9-A90B-D1CDB0D71FC4}"/>
               </a:ext>
             </a:extLst>
           </p:cNvPr>
@@ -1857,7 +1858,7 @@
           <p:cNvPr id="9" name="Slide Number Placeholder 8">
             <a:extLst>
               <a:ext uri="{FF2B5EF4-FFF2-40B4-BE49-F238E27FC236}">
-                <a16:creationId xmlns:a16="http://schemas.microsoft.com/office/drawing/2014/main" xmlns="" id="{57DED464-3392-45EB-B1ED-A033C3E0A112}"/>
+                <a16:creationId xmlns="" xmlns:a16="http://schemas.microsoft.com/office/drawing/2014/main" id="{57DED464-3392-45EB-B1ED-A033C3E0A112}"/>
               </a:ext>
             </a:extLst>
           </p:cNvPr>
@@ -1916,7 +1917,7 @@
           <p:cNvPr id="2" name="Title 1">
             <a:extLst>
               <a:ext uri="{FF2B5EF4-FFF2-40B4-BE49-F238E27FC236}">
-                <a16:creationId xmlns:a16="http://schemas.microsoft.com/office/drawing/2014/main" xmlns="" id="{EF8637D7-C3BB-4217-B85D-B7DBD47CEE2D}"/>
+                <a16:creationId xmlns="" xmlns:a16="http://schemas.microsoft.com/office/drawing/2014/main" id="{EF8637D7-C3BB-4217-B85D-B7DBD47CEE2D}"/>
               </a:ext>
             </a:extLst>
           </p:cNvPr>
@@ -1944,7 +1945,7 @@
           <p:cNvPr id="3" name="Date Placeholder 2">
             <a:extLst>
               <a:ext uri="{FF2B5EF4-FFF2-40B4-BE49-F238E27FC236}">
-                <a16:creationId xmlns:a16="http://schemas.microsoft.com/office/drawing/2014/main" xmlns="" id="{2D7E59C0-595B-4FE4-B924-22189A6D1472}"/>
+                <a16:creationId xmlns="" xmlns:a16="http://schemas.microsoft.com/office/drawing/2014/main" id="{2D7E59C0-595B-4FE4-B924-22189A6D1472}"/>
               </a:ext>
             </a:extLst>
           </p:cNvPr>
@@ -1962,7 +1963,7 @@
           <a:p>
             <a:fld id="{98721B90-EA1F-4164-9F70-3DC63C567694}" type="datetimeFigureOut">
               <a:rPr lang="en-US" smtClean="0"/>
-              <a:t>7/25/2020</a:t>
+              <a:t>8/4/2020</a:t>
             </a:fld>
             <a:endParaRPr lang="en-US"/>
           </a:p>
@@ -1973,7 +1974,7 @@
           <p:cNvPr id="4" name="Footer Placeholder 3">
             <a:extLst>
               <a:ext uri="{FF2B5EF4-FFF2-40B4-BE49-F238E27FC236}">
-                <a16:creationId xmlns:a16="http://schemas.microsoft.com/office/drawing/2014/main" xmlns="" id="{692F5F27-989C-4B58-A7CC-95BED303EACA}"/>
+                <a16:creationId xmlns="" xmlns:a16="http://schemas.microsoft.com/office/drawing/2014/main" id="{692F5F27-989C-4B58-A7CC-95BED303EACA}"/>
               </a:ext>
             </a:extLst>
           </p:cNvPr>
@@ -1998,7 +1999,7 @@
           <p:cNvPr id="5" name="Slide Number Placeholder 4">
             <a:extLst>
               <a:ext uri="{FF2B5EF4-FFF2-40B4-BE49-F238E27FC236}">
-                <a16:creationId xmlns:a16="http://schemas.microsoft.com/office/drawing/2014/main" xmlns="" id="{DA7B9EC8-BB64-4DA0-BDE8-6CCF317279FD}"/>
+                <a16:creationId xmlns="" xmlns:a16="http://schemas.microsoft.com/office/drawing/2014/main" id="{DA7B9EC8-BB64-4DA0-BDE8-6CCF317279FD}"/>
               </a:ext>
             </a:extLst>
           </p:cNvPr>
@@ -2057,7 +2058,7 @@
           <p:cNvPr id="2" name="Date Placeholder 1">
             <a:extLst>
               <a:ext uri="{FF2B5EF4-FFF2-40B4-BE49-F238E27FC236}">
-                <a16:creationId xmlns:a16="http://schemas.microsoft.com/office/drawing/2014/main" xmlns="" id="{59DE5FC8-94B3-44B2-BDBF-A6BC9C9DF3CF}"/>
+                <a16:creationId xmlns="" xmlns:a16="http://schemas.microsoft.com/office/drawing/2014/main" id="{59DE5FC8-94B3-44B2-BDBF-A6BC9C9DF3CF}"/>
               </a:ext>
             </a:extLst>
           </p:cNvPr>
@@ -2075,7 +2076,7 @@
           <a:p>
             <a:fld id="{98721B90-EA1F-4164-9F70-3DC63C567694}" type="datetimeFigureOut">
               <a:rPr lang="en-US" smtClean="0"/>
-              <a:t>7/25/2020</a:t>
+              <a:t>8/4/2020</a:t>
             </a:fld>
             <a:endParaRPr lang="en-US"/>
           </a:p>
@@ -2086,7 +2087,7 @@
           <p:cNvPr id="3" name="Footer Placeholder 2">
             <a:extLst>
               <a:ext uri="{FF2B5EF4-FFF2-40B4-BE49-F238E27FC236}">
-                <a16:creationId xmlns:a16="http://schemas.microsoft.com/office/drawing/2014/main" xmlns="" id="{F5982889-7D00-4A19-97C1-98DC2CA71483}"/>
+                <a16:creationId xmlns="" xmlns:a16="http://schemas.microsoft.com/office/drawing/2014/main" id="{F5982889-7D00-4A19-97C1-98DC2CA71483}"/>
               </a:ext>
             </a:extLst>
           </p:cNvPr>
@@ -2111,7 +2112,7 @@
           <p:cNvPr id="4" name="Slide Number Placeholder 3">
             <a:extLst>
               <a:ext uri="{FF2B5EF4-FFF2-40B4-BE49-F238E27FC236}">
-                <a16:creationId xmlns:a16="http://schemas.microsoft.com/office/drawing/2014/main" xmlns="" id="{B59478C4-AE87-4EBE-ABB3-31E53037E87C}"/>
+                <a16:creationId xmlns="" xmlns:a16="http://schemas.microsoft.com/office/drawing/2014/main" id="{B59478C4-AE87-4EBE-ABB3-31E53037E87C}"/>
               </a:ext>
             </a:extLst>
           </p:cNvPr>
@@ -2170,7 +2171,7 @@
           <p:cNvPr id="2" name="Title 1">
             <a:extLst>
               <a:ext uri="{FF2B5EF4-FFF2-40B4-BE49-F238E27FC236}">
-                <a16:creationId xmlns:a16="http://schemas.microsoft.com/office/drawing/2014/main" xmlns="" id="{B79336E2-0D5F-44BB-821A-E25C0B667256}"/>
+                <a16:creationId xmlns="" xmlns:a16="http://schemas.microsoft.com/office/drawing/2014/main" id="{B79336E2-0D5F-44BB-821A-E25C0B667256}"/>
               </a:ext>
             </a:extLst>
           </p:cNvPr>
@@ -2207,7 +2208,7 @@
           <p:cNvPr id="3" name="Content Placeholder 2">
             <a:extLst>
               <a:ext uri="{FF2B5EF4-FFF2-40B4-BE49-F238E27FC236}">
-                <a16:creationId xmlns:a16="http://schemas.microsoft.com/office/drawing/2014/main" xmlns="" id="{2CA87049-E14C-431A-9832-2850179E953F}"/>
+                <a16:creationId xmlns="" xmlns:a16="http://schemas.microsoft.com/office/drawing/2014/main" id="{2CA87049-E14C-431A-9832-2850179E953F}"/>
               </a:ext>
             </a:extLst>
           </p:cNvPr>
@@ -2297,7 +2298,7 @@
           <p:cNvPr id="4" name="Text Placeholder 3">
             <a:extLst>
               <a:ext uri="{FF2B5EF4-FFF2-40B4-BE49-F238E27FC236}">
-                <a16:creationId xmlns:a16="http://schemas.microsoft.com/office/drawing/2014/main" xmlns="" id="{F131DA67-55A3-4233-A5F8-847AC2A4B66D}"/>
+                <a16:creationId xmlns="" xmlns:a16="http://schemas.microsoft.com/office/drawing/2014/main" id="{F131DA67-55A3-4233-A5F8-847AC2A4B66D}"/>
               </a:ext>
             </a:extLst>
           </p:cNvPr>
@@ -2368,7 +2369,7 @@
           <p:cNvPr id="5" name="Date Placeholder 4">
             <a:extLst>
               <a:ext uri="{FF2B5EF4-FFF2-40B4-BE49-F238E27FC236}">
-                <a16:creationId xmlns:a16="http://schemas.microsoft.com/office/drawing/2014/main" xmlns="" id="{3D31B9B8-EE4F-4265-857F-E45D6DD659D5}"/>
+                <a16:creationId xmlns="" xmlns:a16="http://schemas.microsoft.com/office/drawing/2014/main" id="{3D31B9B8-EE4F-4265-857F-E45D6DD659D5}"/>
               </a:ext>
             </a:extLst>
           </p:cNvPr>
@@ -2386,7 +2387,7 @@
           <a:p>
             <a:fld id="{98721B90-EA1F-4164-9F70-3DC63C567694}" type="datetimeFigureOut">
               <a:rPr lang="en-US" smtClean="0"/>
-              <a:t>7/25/2020</a:t>
+              <a:t>8/4/2020</a:t>
             </a:fld>
             <a:endParaRPr lang="en-US"/>
           </a:p>
@@ -2397,7 +2398,7 @@
           <p:cNvPr id="6" name="Footer Placeholder 5">
             <a:extLst>
               <a:ext uri="{FF2B5EF4-FFF2-40B4-BE49-F238E27FC236}">
-                <a16:creationId xmlns:a16="http://schemas.microsoft.com/office/drawing/2014/main" xmlns="" id="{FE960BD5-CB2F-4D40-A230-6672B5363789}"/>
+                <a16:creationId xmlns="" xmlns:a16="http://schemas.microsoft.com/office/drawing/2014/main" id="{FE960BD5-CB2F-4D40-A230-6672B5363789}"/>
               </a:ext>
             </a:extLst>
           </p:cNvPr>
@@ -2422,7 +2423,7 @@
           <p:cNvPr id="7" name="Slide Number Placeholder 6">
             <a:extLst>
               <a:ext uri="{FF2B5EF4-FFF2-40B4-BE49-F238E27FC236}">
-                <a16:creationId xmlns:a16="http://schemas.microsoft.com/office/drawing/2014/main" xmlns="" id="{CD806A20-3807-49AD-AD54-AB27A45AEE12}"/>
+                <a16:creationId xmlns="" xmlns:a16="http://schemas.microsoft.com/office/drawing/2014/main" id="{CD806A20-3807-49AD-AD54-AB27A45AEE12}"/>
               </a:ext>
             </a:extLst>
           </p:cNvPr>
@@ -2481,7 +2482,7 @@
           <p:cNvPr id="2" name="Title 1">
             <a:extLst>
               <a:ext uri="{FF2B5EF4-FFF2-40B4-BE49-F238E27FC236}">
-                <a16:creationId xmlns:a16="http://schemas.microsoft.com/office/drawing/2014/main" xmlns="" id="{FD420917-2D91-444D-8E26-B9556A194718}"/>
+                <a16:creationId xmlns="" xmlns:a16="http://schemas.microsoft.com/office/drawing/2014/main" id="{FD420917-2D91-444D-8E26-B9556A194718}"/>
               </a:ext>
             </a:extLst>
           </p:cNvPr>
@@ -2518,7 +2519,7 @@
           <p:cNvPr id="3" name="Picture Placeholder 2">
             <a:extLst>
               <a:ext uri="{FF2B5EF4-FFF2-40B4-BE49-F238E27FC236}">
-                <a16:creationId xmlns:a16="http://schemas.microsoft.com/office/drawing/2014/main" xmlns="" id="{73CB466E-64E2-4926-9497-6A9F215E8502}"/>
+                <a16:creationId xmlns="" xmlns:a16="http://schemas.microsoft.com/office/drawing/2014/main" id="{73CB466E-64E2-4926-9497-6A9F215E8502}"/>
               </a:ext>
             </a:extLst>
           </p:cNvPr>
@@ -2585,7 +2586,7 @@
           <p:cNvPr id="4" name="Text Placeholder 3">
             <a:extLst>
               <a:ext uri="{FF2B5EF4-FFF2-40B4-BE49-F238E27FC236}">
-                <a16:creationId xmlns:a16="http://schemas.microsoft.com/office/drawing/2014/main" xmlns="" id="{7C795F0B-18B0-492B-8EB0-C08372CCCFED}"/>
+                <a16:creationId xmlns="" xmlns:a16="http://schemas.microsoft.com/office/drawing/2014/main" id="{7C795F0B-18B0-492B-8EB0-C08372CCCFED}"/>
               </a:ext>
             </a:extLst>
           </p:cNvPr>
@@ -2656,7 +2657,7 @@
           <p:cNvPr id="5" name="Date Placeholder 4">
             <a:extLst>
               <a:ext uri="{FF2B5EF4-FFF2-40B4-BE49-F238E27FC236}">
-                <a16:creationId xmlns:a16="http://schemas.microsoft.com/office/drawing/2014/main" xmlns="" id="{7708FA5F-C914-4F70-9CDA-8F1A60A802D1}"/>
+                <a16:creationId xmlns="" xmlns:a16="http://schemas.microsoft.com/office/drawing/2014/main" id="{7708FA5F-C914-4F70-9CDA-8F1A60A802D1}"/>
               </a:ext>
             </a:extLst>
           </p:cNvPr>
@@ -2674,7 +2675,7 @@
           <a:p>
             <a:fld id="{98721B90-EA1F-4164-9F70-3DC63C567694}" type="datetimeFigureOut">
               <a:rPr lang="en-US" smtClean="0"/>
-              <a:t>7/25/2020</a:t>
+              <a:t>8/4/2020</a:t>
             </a:fld>
             <a:endParaRPr lang="en-US"/>
           </a:p>
@@ -2685,7 +2686,7 @@
           <p:cNvPr id="6" name="Footer Placeholder 5">
             <a:extLst>
               <a:ext uri="{FF2B5EF4-FFF2-40B4-BE49-F238E27FC236}">
-                <a16:creationId xmlns:a16="http://schemas.microsoft.com/office/drawing/2014/main" xmlns="" id="{A93A763D-23E8-4D78-8323-972E46D49395}"/>
+                <a16:creationId xmlns="" xmlns:a16="http://schemas.microsoft.com/office/drawing/2014/main" id="{A93A763D-23E8-4D78-8323-972E46D49395}"/>
               </a:ext>
             </a:extLst>
           </p:cNvPr>
@@ -2710,7 +2711,7 @@
           <p:cNvPr id="7" name="Slide Number Placeholder 6">
             <a:extLst>
               <a:ext uri="{FF2B5EF4-FFF2-40B4-BE49-F238E27FC236}">
-                <a16:creationId xmlns:a16="http://schemas.microsoft.com/office/drawing/2014/main" xmlns="" id="{D1685C9B-E5E2-4B08-A7FC-56C4D1BB6974}"/>
+                <a16:creationId xmlns="" xmlns:a16="http://schemas.microsoft.com/office/drawing/2014/main" id="{D1685C9B-E5E2-4B08-A7FC-56C4D1BB6974}"/>
               </a:ext>
             </a:extLst>
           </p:cNvPr>
@@ -2774,7 +2775,7 @@
           <p:cNvPr id="2" name="Title Placeholder 1">
             <a:extLst>
               <a:ext uri="{FF2B5EF4-FFF2-40B4-BE49-F238E27FC236}">
-                <a16:creationId xmlns:a16="http://schemas.microsoft.com/office/drawing/2014/main" xmlns="" id="{63E96A8E-7487-41FD-A45E-3D23FA78CED7}"/>
+                <a16:creationId xmlns="" xmlns:a16="http://schemas.microsoft.com/office/drawing/2014/main" id="{63E96A8E-7487-41FD-A45E-3D23FA78CED7}"/>
               </a:ext>
             </a:extLst>
           </p:cNvPr>
@@ -2812,7 +2813,7 @@
           <p:cNvPr id="3" name="Text Placeholder 2">
             <a:extLst>
               <a:ext uri="{FF2B5EF4-FFF2-40B4-BE49-F238E27FC236}">
-                <a16:creationId xmlns:a16="http://schemas.microsoft.com/office/drawing/2014/main" xmlns="" id="{968260CC-7F53-4C99-9A0A-EB4F8D8FC608}"/>
+                <a16:creationId xmlns="" xmlns:a16="http://schemas.microsoft.com/office/drawing/2014/main" id="{968260CC-7F53-4C99-9A0A-EB4F8D8FC608}"/>
               </a:ext>
             </a:extLst>
           </p:cNvPr>
@@ -2879,7 +2880,7 @@
           <p:cNvPr id="4" name="Date Placeholder 3">
             <a:extLst>
               <a:ext uri="{FF2B5EF4-FFF2-40B4-BE49-F238E27FC236}">
-                <a16:creationId xmlns:a16="http://schemas.microsoft.com/office/drawing/2014/main" xmlns="" id="{BA01F010-9DE4-41CD-9CA3-9623B55DFDF4}"/>
+                <a16:creationId xmlns="" xmlns:a16="http://schemas.microsoft.com/office/drawing/2014/main" id="{BA01F010-9DE4-41CD-9CA3-9623B55DFDF4}"/>
               </a:ext>
             </a:extLst>
           </p:cNvPr>
@@ -2915,7 +2916,7 @@
           <a:p>
             <a:fld id="{98721B90-EA1F-4164-9F70-3DC63C567694}" type="datetimeFigureOut">
               <a:rPr lang="en-US" smtClean="0"/>
-              <a:t>7/25/2020</a:t>
+              <a:t>8/4/2020</a:t>
             </a:fld>
             <a:endParaRPr lang="en-US"/>
           </a:p>
@@ -2926,7 +2927,7 @@
           <p:cNvPr id="5" name="Footer Placeholder 4">
             <a:extLst>
               <a:ext uri="{FF2B5EF4-FFF2-40B4-BE49-F238E27FC236}">
-                <a16:creationId xmlns:a16="http://schemas.microsoft.com/office/drawing/2014/main" xmlns="" id="{E3717DAA-4644-4DFC-85F9-B076D447B9DC}"/>
+                <a16:creationId xmlns="" xmlns:a16="http://schemas.microsoft.com/office/drawing/2014/main" id="{E3717DAA-4644-4DFC-85F9-B076D447B9DC}"/>
               </a:ext>
             </a:extLst>
           </p:cNvPr>
@@ -2969,7 +2970,7 @@
           <p:cNvPr id="6" name="Slide Number Placeholder 5">
             <a:extLst>
               <a:ext uri="{FF2B5EF4-FFF2-40B4-BE49-F238E27FC236}">
-                <a16:creationId xmlns:a16="http://schemas.microsoft.com/office/drawing/2014/main" xmlns="" id="{F7903408-9FEF-457A-87C5-414240E813D2}"/>
+                <a16:creationId xmlns="" xmlns:a16="http://schemas.microsoft.com/office/drawing/2014/main" id="{F7903408-9FEF-457A-87C5-414240E813D2}"/>
               </a:ext>
             </a:extLst>
           </p:cNvPr>
@@ -3337,7 +3338,7 @@
           <p:cNvPr id="2" name="Title 1">
             <a:extLst>
               <a:ext uri="{FF2B5EF4-FFF2-40B4-BE49-F238E27FC236}">
-                <a16:creationId xmlns:a16="http://schemas.microsoft.com/office/drawing/2014/main" xmlns="" id="{8497210B-1188-4DD5-B09F-8F373C037484}"/>
+                <a16:creationId xmlns="" xmlns:a16="http://schemas.microsoft.com/office/drawing/2014/main" id="{8497210B-1188-4DD5-B09F-8F373C037484}"/>
               </a:ext>
             </a:extLst>
           </p:cNvPr>
@@ -3370,7 +3371,7 @@
           <p:cNvPr id="3" name="Subtitle 2">
             <a:extLst>
               <a:ext uri="{FF2B5EF4-FFF2-40B4-BE49-F238E27FC236}">
-                <a16:creationId xmlns:a16="http://schemas.microsoft.com/office/drawing/2014/main" xmlns="" id="{5C1518D1-C4B3-48DE-819C-4D7971D44132}"/>
+                <a16:creationId xmlns="" xmlns:a16="http://schemas.microsoft.com/office/drawing/2014/main" id="{5C1518D1-C4B3-48DE-819C-4D7971D44132}"/>
               </a:ext>
             </a:extLst>
           </p:cNvPr>
@@ -3429,10 +3430,557 @@
       </p:grpSpPr>
       <p:sp>
         <p:nvSpPr>
+          <p:cNvPr id="4" name="Rectangle 3">
+            <a:extLst>
+              <a:ext uri="{FF2B5EF4-FFF2-40B4-BE49-F238E27FC236}">
+                <a16:creationId xmlns="" xmlns:a16="http://schemas.microsoft.com/office/drawing/2014/main" id="{ADD27894-02D3-4F7D-8500-723F9874850D}"/>
+              </a:ext>
+            </a:extLst>
+          </p:cNvPr>
+          <p:cNvSpPr/>
+          <p:nvPr/>
+        </p:nvSpPr>
+        <p:spPr>
+          <a:xfrm>
+            <a:off x="5157227" y="1158660"/>
+            <a:ext cx="2831909" cy="3972140"/>
+          </a:xfrm>
+          <a:prstGeom prst="rect">
+            <a:avLst/>
+          </a:prstGeom>
+          <a:noFill/>
+        </p:spPr>
+        <p:style>
+          <a:lnRef idx="2">
+            <a:schemeClr val="accent1">
+              <a:shade val="50000"/>
+            </a:schemeClr>
+          </a:lnRef>
+          <a:fillRef idx="1">
+            <a:schemeClr val="accent1"/>
+          </a:fillRef>
+          <a:effectRef idx="0">
+            <a:schemeClr val="accent1"/>
+          </a:effectRef>
+          <a:fontRef idx="minor">
+            <a:schemeClr val="lt1"/>
+          </a:fontRef>
+        </p:style>
+        <p:txBody>
+          <a:bodyPr rtlCol="0" anchor="ctr"/>
+          <a:lstStyle/>
+          <a:p>
+            <a:r>
+              <a:rPr lang="en-SG" dirty="0">
+                <a:solidFill>
+                  <a:schemeClr val="tx1"/>
+                </a:solidFill>
+              </a:rPr>
+              <a:t>Trace Node:</a:t>
+            </a:r>
+          </a:p>
+          <a:p>
+            <a:pPr marL="285750" indent="-285750">
+              <a:buFontTx/>
+              <a:buChar char="-"/>
+            </a:pPr>
+            <a:r>
+              <a:rPr lang="en-SG" dirty="0">
+                <a:solidFill>
+                  <a:schemeClr val="tx1"/>
+                </a:solidFill>
+              </a:rPr>
+              <a:t>trace node id (</a:t>
+            </a:r>
+            <a:r>
+              <a:rPr lang="en-SG" dirty="0" err="1">
+                <a:solidFill>
+                  <a:schemeClr val="tx1"/>
+                </a:solidFill>
+              </a:rPr>
+              <a:t>block_file_path+seq_id</a:t>
+            </a:r>
+            <a:r>
+              <a:rPr lang="en-SG" dirty="0">
+                <a:solidFill>
+                  <a:schemeClr val="tx1"/>
+                </a:solidFill>
+              </a:rPr>
+              <a:t>)</a:t>
+            </a:r>
+          </a:p>
+          <a:p>
+            <a:pPr marL="285750" indent="-285750">
+              <a:buFontTx/>
+              <a:buChar char="-"/>
+            </a:pPr>
+            <a:endParaRPr lang="en-SG" dirty="0">
+              <a:solidFill>
+                <a:schemeClr val="tx1"/>
+              </a:solidFill>
+            </a:endParaRPr>
+          </a:p>
+          <a:p>
+            <a:pPr marL="342900" indent="-342900">
+              <a:buAutoNum type="arabicPeriod"/>
+            </a:pPr>
+            <a:r>
+              <a:rPr lang="en-SG" dirty="0">
+                <a:solidFill>
+                  <a:schemeClr val="tx1"/>
+                </a:solidFill>
+              </a:rPr>
+              <a:t>ref to read/written variables</a:t>
+            </a:r>
+          </a:p>
+          <a:p>
+            <a:pPr marL="342900" indent="-342900">
+              <a:buAutoNum type="arabicPeriod"/>
+            </a:pPr>
+            <a:r>
+              <a:rPr lang="en-SG" dirty="0">
+                <a:solidFill>
+                  <a:schemeClr val="tx1"/>
+                </a:solidFill>
+              </a:rPr>
+              <a:t>Ref to data/control dependency</a:t>
+            </a:r>
+          </a:p>
+          <a:p>
+            <a:pPr marL="342900" indent="-342900">
+              <a:buAutoNum type="arabicPeriod"/>
+            </a:pPr>
+            <a:r>
+              <a:rPr lang="en-SG" dirty="0">
+                <a:solidFill>
+                  <a:schemeClr val="tx1"/>
+                </a:solidFill>
+              </a:rPr>
+              <a:t>Ref to Hierarchical Children (invocation/loop children)</a:t>
+            </a:r>
+            <a:br>
+              <a:rPr lang="en-SG" dirty="0">
+                <a:solidFill>
+                  <a:schemeClr val="tx1"/>
+                </a:solidFill>
+              </a:rPr>
+            </a:br>
+            <a:endParaRPr lang="en-US" dirty="0">
+              <a:solidFill>
+                <a:schemeClr val="tx1"/>
+              </a:solidFill>
+            </a:endParaRPr>
+          </a:p>
+        </p:txBody>
+      </p:sp>
+      <p:sp>
+        <p:nvSpPr>
+          <p:cNvPr id="5" name="Rectangle 4">
+            <a:extLst>
+              <a:ext uri="{FF2B5EF4-FFF2-40B4-BE49-F238E27FC236}">
+                <a16:creationId xmlns="" xmlns:a16="http://schemas.microsoft.com/office/drawing/2014/main" id="{E3C7068E-D01A-4E3E-B8C1-55FF8AFF3342}"/>
+              </a:ext>
+            </a:extLst>
+          </p:cNvPr>
+          <p:cNvSpPr/>
+          <p:nvPr/>
+        </p:nvSpPr>
+        <p:spPr>
+          <a:xfrm>
+            <a:off x="9477828" y="2091989"/>
+            <a:ext cx="1724054" cy="378415"/>
+          </a:xfrm>
+          <a:prstGeom prst="rect">
+            <a:avLst/>
+          </a:prstGeom>
+          <a:noFill/>
+        </p:spPr>
+        <p:style>
+          <a:lnRef idx="2">
+            <a:schemeClr val="accent1">
+              <a:shade val="50000"/>
+            </a:schemeClr>
+          </a:lnRef>
+          <a:fillRef idx="1">
+            <a:schemeClr val="accent1"/>
+          </a:fillRef>
+          <a:effectRef idx="0">
+            <a:schemeClr val="accent1"/>
+          </a:effectRef>
+          <a:fontRef idx="minor">
+            <a:schemeClr val="lt1"/>
+          </a:fontRef>
+        </p:style>
+        <p:txBody>
+          <a:bodyPr rot="0" spcFirstLastPara="0" vertOverflow="overflow" horzOverflow="overflow" vert="horz" wrap="square" lIns="91440" tIns="45720" rIns="91440" bIns="45720" numCol="1" spcCol="0" rtlCol="0" fromWordArt="0" anchor="ctr" anchorCtr="0" forceAA="0" compatLnSpc="1">
+            <a:prstTxWarp prst="textNoShape">
+              <a:avLst/>
+            </a:prstTxWarp>
+            <a:noAutofit/>
+          </a:bodyPr>
+          <a:lstStyle/>
+          <a:p>
+            <a:r>
+              <a:rPr lang="en-SG" dirty="0">
+                <a:solidFill>
+                  <a:schemeClr val="tx1"/>
+                </a:solidFill>
+              </a:rPr>
+              <a:t>Variable File?</a:t>
+            </a:r>
+            <a:endParaRPr lang="en-US" dirty="0">
+              <a:solidFill>
+                <a:schemeClr val="tx1"/>
+              </a:solidFill>
+            </a:endParaRPr>
+          </a:p>
+        </p:txBody>
+      </p:sp>
+      <p:cxnSp>
+        <p:nvCxnSpPr>
+          <p:cNvPr id="6" name="Connector: Elbow 5">
+            <a:extLst>
+              <a:ext uri="{FF2B5EF4-FFF2-40B4-BE49-F238E27FC236}">
+                <a16:creationId xmlns="" xmlns:a16="http://schemas.microsoft.com/office/drawing/2014/main" id="{1A85D5D1-EC86-416B-82E8-FC836BF31A96}"/>
+              </a:ext>
+            </a:extLst>
+          </p:cNvPr>
+          <p:cNvCxnSpPr>
+            <a:cxnSpLocks/>
+            <a:stCxn id="4" idx="1"/>
+            <a:endCxn id="4" idx="0"/>
+          </p:cNvCxnSpPr>
+          <p:nvPr/>
+        </p:nvCxnSpPr>
+        <p:spPr>
+          <a:xfrm rot="10800000" flipH="1">
+            <a:off x="5157226" y="1158660"/>
+            <a:ext cx="1415955" cy="1986070"/>
+          </a:xfrm>
+          <a:prstGeom prst="bentConnector4">
+            <a:avLst>
+              <a:gd name="adj1" fmla="val -16145"/>
+              <a:gd name="adj2" fmla="val 111510"/>
+            </a:avLst>
+          </a:prstGeom>
+          <a:ln>
+            <a:tailEnd type="triangle" w="lg" len="lg"/>
+          </a:ln>
+        </p:spPr>
+        <p:style>
+          <a:lnRef idx="1">
+            <a:schemeClr val="accent1"/>
+          </a:lnRef>
+          <a:fillRef idx="0">
+            <a:schemeClr val="accent1"/>
+          </a:fillRef>
+          <a:effectRef idx="0">
+            <a:schemeClr val="accent1"/>
+          </a:effectRef>
+          <a:fontRef idx="minor">
+            <a:schemeClr val="tx1"/>
+          </a:fontRef>
+        </p:style>
+      </p:cxnSp>
+      <p:cxnSp>
+        <p:nvCxnSpPr>
+          <p:cNvPr id="7" name="Connector: Elbow 6">
+            <a:extLst>
+              <a:ext uri="{FF2B5EF4-FFF2-40B4-BE49-F238E27FC236}">
+                <a16:creationId xmlns="" xmlns:a16="http://schemas.microsoft.com/office/drawing/2014/main" id="{72A2CCAF-75C7-40E9-A607-135FCD5BDE61}"/>
+              </a:ext>
+            </a:extLst>
+          </p:cNvPr>
+          <p:cNvCxnSpPr>
+            <a:cxnSpLocks/>
+            <a:stCxn id="4" idx="3"/>
+            <a:endCxn id="5" idx="1"/>
+          </p:cNvCxnSpPr>
+          <p:nvPr/>
+        </p:nvCxnSpPr>
+        <p:spPr>
+          <a:xfrm flipV="1">
+            <a:off x="7989136" y="2281197"/>
+            <a:ext cx="1488692" cy="863533"/>
+          </a:xfrm>
+          <a:prstGeom prst="bentConnector3">
+            <a:avLst/>
+          </a:prstGeom>
+          <a:ln>
+            <a:tailEnd type="triangle"/>
+          </a:ln>
+        </p:spPr>
+        <p:style>
+          <a:lnRef idx="1">
+            <a:schemeClr val="accent1"/>
+          </a:lnRef>
+          <a:fillRef idx="0">
+            <a:schemeClr val="accent1"/>
+          </a:fillRef>
+          <a:effectRef idx="0">
+            <a:schemeClr val="accent1"/>
+          </a:effectRef>
+          <a:fontRef idx="minor">
+            <a:schemeClr val="tx1"/>
+          </a:fontRef>
+        </p:style>
+      </p:cxnSp>
+      <p:sp>
+        <p:nvSpPr>
+          <p:cNvPr id="8" name="Rectangle 7">
+            <a:extLst>
+              <a:ext uri="{FF2B5EF4-FFF2-40B4-BE49-F238E27FC236}">
+                <a16:creationId xmlns="" xmlns:a16="http://schemas.microsoft.com/office/drawing/2014/main" id="{81E41073-32BA-4270-B734-E8DD14034463}"/>
+              </a:ext>
+            </a:extLst>
+          </p:cNvPr>
+          <p:cNvSpPr/>
+          <p:nvPr/>
+        </p:nvSpPr>
+        <p:spPr>
+          <a:xfrm>
+            <a:off x="1306340" y="3589879"/>
+            <a:ext cx="1724054" cy="671587"/>
+          </a:xfrm>
+          <a:prstGeom prst="rect">
+            <a:avLst/>
+          </a:prstGeom>
+          <a:noFill/>
+        </p:spPr>
+        <p:style>
+          <a:lnRef idx="2">
+            <a:schemeClr val="accent1">
+              <a:shade val="50000"/>
+            </a:schemeClr>
+          </a:lnRef>
+          <a:fillRef idx="1">
+            <a:schemeClr val="accent1"/>
+          </a:fillRef>
+          <a:effectRef idx="0">
+            <a:schemeClr val="accent1"/>
+          </a:effectRef>
+          <a:fontRef idx="minor">
+            <a:schemeClr val="lt1"/>
+          </a:fontRef>
+        </p:style>
+        <p:txBody>
+          <a:bodyPr rot="0" spcFirstLastPara="0" vertOverflow="overflow" horzOverflow="overflow" vert="horz" wrap="square" lIns="91440" tIns="45720" rIns="91440" bIns="45720" numCol="1" spcCol="0" rtlCol="0" fromWordArt="0" anchor="ctr" anchorCtr="0" forceAA="0" compatLnSpc="1">
+            <a:prstTxWarp prst="textNoShape">
+              <a:avLst/>
+            </a:prstTxWarp>
+            <a:noAutofit/>
+          </a:bodyPr>
+          <a:lstStyle/>
+          <a:p>
+            <a:r>
+              <a:rPr lang="en-SG" dirty="0">
+                <a:solidFill>
+                  <a:schemeClr val="tx1"/>
+                </a:solidFill>
+              </a:rPr>
+              <a:t>Trace Header file (execution)</a:t>
+            </a:r>
+            <a:endParaRPr lang="en-US" dirty="0">
+              <a:solidFill>
+                <a:schemeClr val="tx1"/>
+              </a:solidFill>
+            </a:endParaRPr>
+          </a:p>
+        </p:txBody>
+      </p:sp>
+      <p:sp>
+        <p:nvSpPr>
+          <p:cNvPr id="9" name="Rectangle 8">
+            <a:extLst>
+              <a:ext uri="{FF2B5EF4-FFF2-40B4-BE49-F238E27FC236}">
+                <a16:creationId xmlns="" xmlns:a16="http://schemas.microsoft.com/office/drawing/2014/main" id="{41CFAC0D-FF55-41D2-8215-966C18F9A802}"/>
+              </a:ext>
+            </a:extLst>
+          </p:cNvPr>
+          <p:cNvSpPr/>
+          <p:nvPr/>
+        </p:nvSpPr>
+        <p:spPr>
+          <a:xfrm>
+            <a:off x="1306340" y="1362237"/>
+            <a:ext cx="1724054" cy="416257"/>
+          </a:xfrm>
+          <a:prstGeom prst="rect">
+            <a:avLst/>
+          </a:prstGeom>
+          <a:noFill/>
+        </p:spPr>
+        <p:style>
+          <a:lnRef idx="2">
+            <a:schemeClr val="accent1">
+              <a:shade val="50000"/>
+            </a:schemeClr>
+          </a:lnRef>
+          <a:fillRef idx="1">
+            <a:schemeClr val="accent1"/>
+          </a:fillRef>
+          <a:effectRef idx="0">
+            <a:schemeClr val="accent1"/>
+          </a:effectRef>
+          <a:fontRef idx="minor">
+            <a:schemeClr val="lt1"/>
+          </a:fontRef>
+        </p:style>
+        <p:txBody>
+          <a:bodyPr rot="0" spcFirstLastPara="0" vertOverflow="overflow" horzOverflow="overflow" vert="horz" wrap="square" lIns="91440" tIns="45720" rIns="91440" bIns="45720" numCol="1" spcCol="0" rtlCol="0" fromWordArt="0" anchor="ctr" anchorCtr="0" forceAA="0" compatLnSpc="1">
+            <a:prstTxWarp prst="textNoShape">
+              <a:avLst/>
+            </a:prstTxWarp>
+            <a:noAutofit/>
+          </a:bodyPr>
+          <a:lstStyle/>
+          <a:p>
+            <a:r>
+              <a:rPr lang="en-SG" dirty="0">
+                <a:solidFill>
+                  <a:schemeClr val="tx1"/>
+                </a:solidFill>
+              </a:rPr>
+              <a:t>Block File</a:t>
+            </a:r>
+            <a:endParaRPr lang="en-US" dirty="0">
+              <a:solidFill>
+                <a:schemeClr val="tx1"/>
+              </a:solidFill>
+            </a:endParaRPr>
+          </a:p>
+        </p:txBody>
+      </p:sp>
+      <p:cxnSp>
+        <p:nvCxnSpPr>
+          <p:cNvPr id="10" name="Connector: Elbow 9">
+            <a:extLst>
+              <a:ext uri="{FF2B5EF4-FFF2-40B4-BE49-F238E27FC236}">
+                <a16:creationId xmlns="" xmlns:a16="http://schemas.microsoft.com/office/drawing/2014/main" id="{12CA1A67-9A30-4B64-8A54-7B9115C60266}"/>
+              </a:ext>
+            </a:extLst>
+          </p:cNvPr>
+          <p:cNvCxnSpPr>
+            <a:cxnSpLocks/>
+            <a:stCxn id="9" idx="2"/>
+          </p:cNvCxnSpPr>
+          <p:nvPr/>
+        </p:nvCxnSpPr>
+        <p:spPr>
+          <a:xfrm rot="16200000" flipH="1">
+            <a:off x="2895277" y="1051584"/>
+            <a:ext cx="1522338" cy="2976158"/>
+          </a:xfrm>
+          <a:prstGeom prst="bentConnector2">
+            <a:avLst/>
+          </a:prstGeom>
+          <a:ln>
+            <a:tailEnd type="triangle" w="lg" len="lg"/>
+          </a:ln>
+        </p:spPr>
+        <p:style>
+          <a:lnRef idx="1">
+            <a:schemeClr val="accent1"/>
+          </a:lnRef>
+          <a:fillRef idx="0">
+            <a:schemeClr val="accent1"/>
+          </a:fillRef>
+          <a:effectRef idx="0">
+            <a:schemeClr val="accent1"/>
+          </a:effectRef>
+          <a:fontRef idx="minor">
+            <a:schemeClr val="tx1"/>
+          </a:fontRef>
+        </p:style>
+      </p:cxnSp>
+      <p:cxnSp>
+        <p:nvCxnSpPr>
+          <p:cNvPr id="11" name="Connector: Elbow 10">
+            <a:extLst>
+              <a:ext uri="{FF2B5EF4-FFF2-40B4-BE49-F238E27FC236}">
+                <a16:creationId xmlns="" xmlns:a16="http://schemas.microsoft.com/office/drawing/2014/main" id="{EC0728E9-347A-43CF-B5F4-1645B132EABB}"/>
+              </a:ext>
+            </a:extLst>
+          </p:cNvPr>
+          <p:cNvCxnSpPr>
+            <a:cxnSpLocks/>
+            <a:stCxn id="8" idx="1"/>
+            <a:endCxn id="9" idx="1"/>
+          </p:cNvCxnSpPr>
+          <p:nvPr/>
+        </p:nvCxnSpPr>
+        <p:spPr>
+          <a:xfrm rot="10800000">
+            <a:off x="1306340" y="1570367"/>
+            <a:ext cx="12700" cy="2355307"/>
+          </a:xfrm>
+          <a:prstGeom prst="bentConnector3">
+            <a:avLst>
+              <a:gd name="adj1" fmla="val 6371425"/>
+            </a:avLst>
+          </a:prstGeom>
+          <a:ln>
+            <a:tailEnd type="triangle" w="lg" len="lg"/>
+          </a:ln>
+        </p:spPr>
+        <p:style>
+          <a:lnRef idx="1">
+            <a:schemeClr val="accent1"/>
+          </a:lnRef>
+          <a:fillRef idx="0">
+            <a:schemeClr val="accent1"/>
+          </a:fillRef>
+          <a:effectRef idx="0">
+            <a:schemeClr val="accent1"/>
+          </a:effectRef>
+          <a:fontRef idx="minor">
+            <a:schemeClr val="tx1"/>
+          </a:fontRef>
+        </p:style>
+      </p:cxnSp>
+    </p:spTree>
+    <p:extLst>
+      <p:ext uri="{BB962C8B-B14F-4D97-AF65-F5344CB8AC3E}">
+        <p14:creationId xmlns:p14="http://schemas.microsoft.com/office/powerpoint/2010/main" val="3444824109"/>
+      </p:ext>
+    </p:extLst>
+  </p:cSld>
+  <p:clrMapOvr>
+    <a:masterClrMapping/>
+  </p:clrMapOvr>
+  <p:timing>
+    <p:tnLst>
+      <p:par>
+        <p:cTn id="1" dur="indefinite" restart="never" nodeType="tmRoot"/>
+      </p:par>
+    </p:tnLst>
+  </p:timing>
+</p:sld>
+</file>
+
+<file path=ppt/slides/slide11.xml><?xml version="1.0" encoding="utf-8"?>
+<p:sld xmlns:a="http://schemas.openxmlformats.org/drawingml/2006/main" xmlns:r="http://schemas.openxmlformats.org/officeDocument/2006/relationships" xmlns:p="http://schemas.openxmlformats.org/presentationml/2006/main">
+  <p:cSld>
+    <p:spTree>
+      <p:nvGrpSpPr>
+        <p:cNvPr id="1" name=""/>
+        <p:cNvGrpSpPr/>
+        <p:nvPr/>
+      </p:nvGrpSpPr>
+      <p:grpSpPr>
+        <a:xfrm>
+          <a:off x="0" y="0"/>
+          <a:ext cx="0" cy="0"/>
+          <a:chOff x="0" y="0"/>
+          <a:chExt cx="0" cy="0"/>
+        </a:xfrm>
+      </p:grpSpPr>
+      <p:sp>
+        <p:nvSpPr>
           <p:cNvPr id="2" name="Title 1">
             <a:extLst>
               <a:ext uri="{FF2B5EF4-FFF2-40B4-BE49-F238E27FC236}">
-                <a16:creationId xmlns:a16="http://schemas.microsoft.com/office/drawing/2014/main" xmlns="" id="{CBBE3911-BB22-47FF-8FD9-8F5EC5E7C107}"/>
+                <a16:creationId xmlns="" xmlns:a16="http://schemas.microsoft.com/office/drawing/2014/main" id="{CBBE3911-BB22-47FF-8FD9-8F5EC5E7C107}"/>
               </a:ext>
             </a:extLst>
           </p:cNvPr>
@@ -3461,7 +4009,7 @@
           <p:cNvPr id="4" name="TextBox 3">
             <a:extLst>
               <a:ext uri="{FF2B5EF4-FFF2-40B4-BE49-F238E27FC236}">
-                <a16:creationId xmlns:a16="http://schemas.microsoft.com/office/drawing/2014/main" xmlns="" id="{8D950D3D-24C6-4F48-B63E-470E8435C0EB}"/>
+                <a16:creationId xmlns="" xmlns:a16="http://schemas.microsoft.com/office/drawing/2014/main" id="{8D950D3D-24C6-4F48-B63E-470E8435C0EB}"/>
               </a:ext>
             </a:extLst>
           </p:cNvPr>
@@ -3529,7 +4077,7 @@
           <p:cNvPr id="5" name="TextBox 4">
             <a:extLst>
               <a:ext uri="{FF2B5EF4-FFF2-40B4-BE49-F238E27FC236}">
-                <a16:creationId xmlns:a16="http://schemas.microsoft.com/office/drawing/2014/main" xmlns="" id="{57746609-CDBA-43F7-9225-AD83C7B115CD}"/>
+                <a16:creationId xmlns="" xmlns:a16="http://schemas.microsoft.com/office/drawing/2014/main" id="{57746609-CDBA-43F7-9225-AD83C7B115CD}"/>
               </a:ext>
             </a:extLst>
           </p:cNvPr>
@@ -3631,7 +4179,7 @@
           <p:cNvPr id="6" name="TextBox 5">
             <a:extLst>
               <a:ext uri="{FF2B5EF4-FFF2-40B4-BE49-F238E27FC236}">
-                <a16:creationId xmlns:a16="http://schemas.microsoft.com/office/drawing/2014/main" xmlns="" id="{D062C7BB-55BD-4EB5-AAE9-66B0BB77DEDB}"/>
+                <a16:creationId xmlns="" xmlns:a16="http://schemas.microsoft.com/office/drawing/2014/main" id="{D062C7BB-55BD-4EB5-AAE9-66B0BB77DEDB}"/>
               </a:ext>
             </a:extLst>
           </p:cNvPr>
@@ -3764,7 +4312,7 @@
           <p:cNvPr id="8" name="TextBox 7">
             <a:extLst>
               <a:ext uri="{FF2B5EF4-FFF2-40B4-BE49-F238E27FC236}">
-                <a16:creationId xmlns:a16="http://schemas.microsoft.com/office/drawing/2014/main" xmlns="" id="{A0892BC8-514A-4FF2-8DEA-7E24B4FD32B3}"/>
+                <a16:creationId xmlns="" xmlns:a16="http://schemas.microsoft.com/office/drawing/2014/main" id="{A0892BC8-514A-4FF2-8DEA-7E24B4FD32B3}"/>
               </a:ext>
             </a:extLst>
           </p:cNvPr>
@@ -3821,7 +4369,7 @@
           <p:cNvPr id="9" name="Connector: Elbow 8">
             <a:extLst>
               <a:ext uri="{FF2B5EF4-FFF2-40B4-BE49-F238E27FC236}">
-                <a16:creationId xmlns:a16="http://schemas.microsoft.com/office/drawing/2014/main" xmlns="" id="{F7E466F1-162D-4A4F-80B9-CA6F12A1DA47}"/>
+                <a16:creationId xmlns="" xmlns:a16="http://schemas.microsoft.com/office/drawing/2014/main" id="{F7E466F1-162D-4A4F-80B9-CA6F12A1DA47}"/>
               </a:ext>
             </a:extLst>
           </p:cNvPr>
@@ -3866,7 +4414,7 @@
           <p:cNvPr id="17" name="Connector: Elbow 16">
             <a:extLst>
               <a:ext uri="{FF2B5EF4-FFF2-40B4-BE49-F238E27FC236}">
-                <a16:creationId xmlns:a16="http://schemas.microsoft.com/office/drawing/2014/main" xmlns="" id="{651518F2-BB22-4628-8296-6CFB31EDC1BC}"/>
+                <a16:creationId xmlns="" xmlns:a16="http://schemas.microsoft.com/office/drawing/2014/main" id="{651518F2-BB22-4628-8296-6CFB31EDC1BC}"/>
               </a:ext>
             </a:extLst>
           </p:cNvPr>
@@ -3911,7 +4459,7 @@
           <p:cNvPr id="21" name="TextBox 20">
             <a:extLst>
               <a:ext uri="{FF2B5EF4-FFF2-40B4-BE49-F238E27FC236}">
-                <a16:creationId xmlns:a16="http://schemas.microsoft.com/office/drawing/2014/main" xmlns="" id="{965AD791-640E-468F-B0CB-A1816EFA8DEE}"/>
+                <a16:creationId xmlns="" xmlns:a16="http://schemas.microsoft.com/office/drawing/2014/main" id="{965AD791-640E-468F-B0CB-A1816EFA8DEE}"/>
               </a:ext>
             </a:extLst>
           </p:cNvPr>
@@ -3964,548 +4512,6 @@
     <p:extLst>
       <p:ext uri="{BB962C8B-B14F-4D97-AF65-F5344CB8AC3E}">
         <p14:creationId xmlns:p14="http://schemas.microsoft.com/office/powerpoint/2010/main" val="2388796992"/>
-      </p:ext>
-    </p:extLst>
-  </p:cSld>
-  <p:clrMapOvr>
-    <a:masterClrMapping/>
-  </p:clrMapOvr>
-  <p:timing>
-    <p:tnLst>
-      <p:par>
-        <p:cTn id="1" dur="indefinite" restart="never" nodeType="tmRoot"/>
-      </p:par>
-    </p:tnLst>
-  </p:timing>
-</p:sld>
-</file>
-
-<file path=ppt/slides/slide11.xml><?xml version="1.0" encoding="utf-8"?>
-<p:sld xmlns:a="http://schemas.openxmlformats.org/drawingml/2006/main" xmlns:r="http://schemas.openxmlformats.org/officeDocument/2006/relationships" xmlns:p="http://schemas.openxmlformats.org/presentationml/2006/main">
-  <p:cSld>
-    <p:spTree>
-      <p:nvGrpSpPr>
-        <p:cNvPr id="1" name=""/>
-        <p:cNvGrpSpPr/>
-        <p:nvPr/>
-      </p:nvGrpSpPr>
-      <p:grpSpPr>
-        <a:xfrm>
-          <a:off x="0" y="0"/>
-          <a:ext cx="0" cy="0"/>
-          <a:chOff x="0" y="0"/>
-          <a:chExt cx="0" cy="0"/>
-        </a:xfrm>
-      </p:grpSpPr>
-      <p:sp>
-        <p:nvSpPr>
-          <p:cNvPr id="4" name="Rectangle 3">
-            <a:extLst>
-              <a:ext uri="{FF2B5EF4-FFF2-40B4-BE49-F238E27FC236}">
-                <a16:creationId xmlns:a16="http://schemas.microsoft.com/office/drawing/2014/main" xmlns="" id="{E3C7068E-D01A-4E3E-B8C1-55FF8AFF3342}"/>
-              </a:ext>
-            </a:extLst>
-          </p:cNvPr>
-          <p:cNvSpPr/>
-          <p:nvPr/>
-        </p:nvSpPr>
-        <p:spPr>
-          <a:xfrm>
-            <a:off x="3333868" y="643333"/>
-            <a:ext cx="2399112" cy="5408146"/>
-          </a:xfrm>
-          <a:prstGeom prst="rect">
-            <a:avLst/>
-          </a:prstGeom>
-          <a:noFill/>
-        </p:spPr>
-        <p:style>
-          <a:lnRef idx="2">
-            <a:schemeClr val="accent1">
-              <a:shade val="50000"/>
-            </a:schemeClr>
-          </a:lnRef>
-          <a:fillRef idx="1">
-            <a:schemeClr val="accent1"/>
-          </a:fillRef>
-          <a:effectRef idx="0">
-            <a:schemeClr val="accent1"/>
-          </a:effectRef>
-          <a:fontRef idx="minor">
-            <a:schemeClr val="lt1"/>
-          </a:fontRef>
-        </p:style>
-        <p:txBody>
-          <a:bodyPr rot="0" spcFirstLastPara="0" vertOverflow="overflow" horzOverflow="overflow" vert="horz" wrap="square" lIns="91440" tIns="45720" rIns="91440" bIns="45720" numCol="1" spcCol="0" rtlCol="0" fromWordArt="0" anchor="t" anchorCtr="0" forceAA="0" compatLnSpc="1">
-            <a:prstTxWarp prst="textNoShape">
-              <a:avLst/>
-            </a:prstTxWarp>
-            <a:noAutofit/>
-          </a:bodyPr>
-          <a:lstStyle/>
-          <a:p>
-            <a:r>
-              <a:rPr lang="en-SG" dirty="0">
-                <a:solidFill>
-                  <a:schemeClr val="tx1"/>
-                </a:solidFill>
-              </a:rPr>
-              <a:t>Variable </a:t>
-            </a:r>
-            <a:r>
-              <a:rPr lang="en-SG" dirty="0" smtClean="0">
-                <a:solidFill>
-                  <a:schemeClr val="tx1"/>
-                </a:solidFill>
-              </a:rPr>
-              <a:t>- Node</a:t>
-            </a:r>
-          </a:p>
-          <a:p>
-            <a:r>
-              <a:rPr lang="en-SG" dirty="0" smtClean="0">
-                <a:solidFill>
-                  <a:schemeClr val="tx1"/>
-                </a:solidFill>
-              </a:rPr>
-              <a:t>------------------------------</a:t>
-            </a:r>
-          </a:p>
-          <a:p>
-            <a:r>
-              <a:rPr lang="en-SG" dirty="0" smtClean="0">
-                <a:solidFill>
-                  <a:schemeClr val="tx1"/>
-                </a:solidFill>
-              </a:rPr>
-              <a:t>Node – PR </a:t>
-            </a:r>
-          </a:p>
-          <a:p>
-            <a:r>
-              <a:rPr lang="en-SG" dirty="0" smtClean="0">
-                <a:solidFill>
-                  <a:schemeClr val="tx1"/>
-                </a:solidFill>
-              </a:rPr>
-              <a:t>Node – CO</a:t>
-            </a:r>
-          </a:p>
-          <a:p>
-            <a:r>
-              <a:rPr lang="en-SG" dirty="0" smtClean="0">
-                <a:solidFill>
-                  <a:schemeClr val="tx1"/>
-                </a:solidFill>
-              </a:rPr>
-              <a:t>Node – DEF</a:t>
-            </a:r>
-          </a:p>
-          <a:p>
-            <a:endParaRPr lang="en-SG" dirty="0" smtClean="0">
-              <a:solidFill>
-                <a:schemeClr val="tx1"/>
-              </a:solidFill>
-            </a:endParaRPr>
-          </a:p>
-          <a:p>
-            <a:endParaRPr lang="en-US" dirty="0">
-              <a:solidFill>
-                <a:schemeClr val="tx1"/>
-              </a:solidFill>
-            </a:endParaRPr>
-          </a:p>
-        </p:txBody>
-      </p:sp>
-      <p:sp>
-        <p:nvSpPr>
-          <p:cNvPr id="5" name="Rectangle 4">
-            <a:extLst>
-              <a:ext uri="{FF2B5EF4-FFF2-40B4-BE49-F238E27FC236}">
-                <a16:creationId xmlns:a16="http://schemas.microsoft.com/office/drawing/2014/main" xmlns="" id="{E3C7068E-D01A-4E3E-B8C1-55FF8AFF3342}"/>
-              </a:ext>
-            </a:extLst>
-          </p:cNvPr>
-          <p:cNvSpPr/>
-          <p:nvPr/>
-        </p:nvSpPr>
-        <p:spPr>
-          <a:xfrm>
-            <a:off x="522104" y="643333"/>
-            <a:ext cx="2477950" cy="5408146"/>
-          </a:xfrm>
-          <a:prstGeom prst="rect">
-            <a:avLst/>
-          </a:prstGeom>
-          <a:noFill/>
-        </p:spPr>
-        <p:style>
-          <a:lnRef idx="2">
-            <a:schemeClr val="accent1">
-              <a:shade val="50000"/>
-            </a:schemeClr>
-          </a:lnRef>
-          <a:fillRef idx="1">
-            <a:schemeClr val="accent1"/>
-          </a:fillRef>
-          <a:effectRef idx="0">
-            <a:schemeClr val="accent1"/>
-          </a:effectRef>
-          <a:fontRef idx="minor">
-            <a:schemeClr val="lt1"/>
-          </a:fontRef>
-        </p:style>
-        <p:txBody>
-          <a:bodyPr rot="0" spcFirstLastPara="0" vertOverflow="overflow" horzOverflow="overflow" vert="horz" wrap="square" lIns="91440" tIns="45720" rIns="91440" bIns="45720" numCol="1" spcCol="0" rtlCol="0" fromWordArt="0" anchor="t" anchorCtr="0" forceAA="0" compatLnSpc="1">
-            <a:prstTxWarp prst="textNoShape">
-              <a:avLst/>
-            </a:prstTxWarp>
-            <a:noAutofit/>
-          </a:bodyPr>
-          <a:lstStyle/>
-          <a:p>
-            <a:r>
-              <a:rPr lang="en-SG" dirty="0" smtClean="0">
-                <a:solidFill>
-                  <a:schemeClr val="tx1"/>
-                </a:solidFill>
-              </a:rPr>
-              <a:t>Node - Variable</a:t>
-            </a:r>
-          </a:p>
-          <a:p>
-            <a:r>
-              <a:rPr lang="en-SG" dirty="0" smtClean="0">
-                <a:solidFill>
-                  <a:schemeClr val="tx1"/>
-                </a:solidFill>
-              </a:rPr>
-              <a:t>------------------------------</a:t>
-            </a:r>
-          </a:p>
-          <a:p>
-            <a:r>
-              <a:rPr lang="en-SG" dirty="0" err="1" smtClean="0">
-                <a:solidFill>
-                  <a:schemeClr val="tx1"/>
-                </a:solidFill>
-              </a:rPr>
-              <a:t>Var</a:t>
-            </a:r>
-            <a:r>
-              <a:rPr lang="en-SG" dirty="0" smtClean="0">
-                <a:solidFill>
-                  <a:schemeClr val="tx1"/>
-                </a:solidFill>
-              </a:rPr>
-              <a:t> – PR</a:t>
-            </a:r>
-          </a:p>
-          <a:p>
-            <a:r>
-              <a:rPr lang="en-SG" dirty="0" err="1" smtClean="0">
-                <a:solidFill>
-                  <a:schemeClr val="tx1"/>
-                </a:solidFill>
-              </a:rPr>
-              <a:t>Var</a:t>
-            </a:r>
-            <a:r>
-              <a:rPr lang="en-SG" dirty="0" smtClean="0">
-                <a:solidFill>
-                  <a:schemeClr val="tx1"/>
-                </a:solidFill>
-              </a:rPr>
-              <a:t> – CO</a:t>
-            </a:r>
-          </a:p>
-          <a:p>
-            <a:r>
-              <a:rPr lang="en-SG" dirty="0" err="1" smtClean="0">
-                <a:solidFill>
-                  <a:schemeClr val="tx1"/>
-                </a:solidFill>
-              </a:rPr>
-              <a:t>Var</a:t>
-            </a:r>
-            <a:r>
-              <a:rPr lang="en-SG" dirty="0" smtClean="0">
-                <a:solidFill>
-                  <a:schemeClr val="tx1"/>
-                </a:solidFill>
-              </a:rPr>
-              <a:t> – DEF</a:t>
-            </a:r>
-          </a:p>
-          <a:p>
-            <a:endParaRPr lang="en-SG" dirty="0" smtClean="0">
-              <a:solidFill>
-                <a:schemeClr val="tx1"/>
-              </a:solidFill>
-            </a:endParaRPr>
-          </a:p>
-          <a:p>
-            <a:endParaRPr lang="en-US" dirty="0">
-              <a:solidFill>
-                <a:schemeClr val="tx1"/>
-              </a:solidFill>
-            </a:endParaRPr>
-          </a:p>
-        </p:txBody>
-      </p:sp>
-      <p:sp>
-        <p:nvSpPr>
-          <p:cNvPr id="6" name="Rectangle 5">
-            <a:extLst>
-              <a:ext uri="{FF2B5EF4-FFF2-40B4-BE49-F238E27FC236}">
-                <a16:creationId xmlns:a16="http://schemas.microsoft.com/office/drawing/2014/main" xmlns="" id="{E3C7068E-D01A-4E3E-B8C1-55FF8AFF3342}"/>
-              </a:ext>
-            </a:extLst>
-          </p:cNvPr>
-          <p:cNvSpPr/>
-          <p:nvPr/>
-        </p:nvSpPr>
-        <p:spPr>
-          <a:xfrm>
-            <a:off x="6149000" y="608572"/>
-            <a:ext cx="2471017" cy="5408146"/>
-          </a:xfrm>
-          <a:prstGeom prst="rect">
-            <a:avLst/>
-          </a:prstGeom>
-          <a:noFill/>
-        </p:spPr>
-        <p:style>
-          <a:lnRef idx="2">
-            <a:schemeClr val="accent1">
-              <a:shade val="50000"/>
-            </a:schemeClr>
-          </a:lnRef>
-          <a:fillRef idx="1">
-            <a:schemeClr val="accent1"/>
-          </a:fillRef>
-          <a:effectRef idx="0">
-            <a:schemeClr val="accent1"/>
-          </a:effectRef>
-          <a:fontRef idx="minor">
-            <a:schemeClr val="lt1"/>
-          </a:fontRef>
-        </p:style>
-        <p:txBody>
-          <a:bodyPr rot="0" spcFirstLastPara="0" vertOverflow="overflow" horzOverflow="overflow" vert="horz" wrap="square" lIns="91440" tIns="45720" rIns="91440" bIns="45720" numCol="1" spcCol="0" rtlCol="0" fromWordArt="0" anchor="t" anchorCtr="0" forceAA="0" compatLnSpc="1">
-            <a:prstTxWarp prst="textNoShape">
-              <a:avLst/>
-            </a:prstTxWarp>
-            <a:noAutofit/>
-          </a:bodyPr>
-          <a:lstStyle/>
-          <a:p>
-            <a:r>
-              <a:rPr lang="en-SG" dirty="0" smtClean="0">
-                <a:solidFill>
-                  <a:schemeClr val="tx1"/>
-                </a:solidFill>
-              </a:rPr>
-              <a:t>Value</a:t>
-            </a:r>
-          </a:p>
-          <a:p>
-            <a:r>
-              <a:rPr lang="en-SG" dirty="0" smtClean="0">
-                <a:solidFill>
-                  <a:schemeClr val="tx1"/>
-                </a:solidFill>
-              </a:rPr>
-              <a:t>------------------------------</a:t>
-            </a:r>
-          </a:p>
-          <a:p>
-            <a:r>
-              <a:rPr lang="en-US" dirty="0" smtClean="0">
-                <a:solidFill>
-                  <a:schemeClr val="tx1"/>
-                </a:solidFill>
-              </a:rPr>
-              <a:t>Offset</a:t>
-            </a:r>
-          </a:p>
-          <a:p>
-            <a:r>
-              <a:rPr lang="en-US" dirty="0" smtClean="0">
-                <a:solidFill>
-                  <a:schemeClr val="tx1"/>
-                </a:solidFill>
-              </a:rPr>
-              <a:t>String </a:t>
-            </a:r>
-            <a:r>
-              <a:rPr lang="en-US" dirty="0" err="1" smtClean="0">
-                <a:solidFill>
-                  <a:schemeClr val="tx1"/>
-                </a:solidFill>
-              </a:rPr>
-              <a:t>varId</a:t>
-            </a:r>
-            <a:endParaRPr lang="en-US" dirty="0" smtClean="0">
-              <a:solidFill>
-                <a:schemeClr val="tx1"/>
-              </a:solidFill>
-            </a:endParaRPr>
-          </a:p>
-          <a:p>
-            <a:r>
-              <a:rPr lang="en-US" dirty="0" smtClean="0">
-                <a:solidFill>
-                  <a:schemeClr val="tx1"/>
-                </a:solidFill>
-              </a:rPr>
-              <a:t>Parent</a:t>
-            </a:r>
-          </a:p>
-          <a:p>
-            <a:endParaRPr lang="en-US" dirty="0">
-              <a:solidFill>
-                <a:schemeClr val="tx1"/>
-              </a:solidFill>
-            </a:endParaRPr>
-          </a:p>
-        </p:txBody>
-      </p:sp>
-      <p:sp>
-        <p:nvSpPr>
-          <p:cNvPr id="7" name="Rectangle 6">
-            <a:extLst>
-              <a:ext uri="{FF2B5EF4-FFF2-40B4-BE49-F238E27FC236}">
-                <a16:creationId xmlns:a16="http://schemas.microsoft.com/office/drawing/2014/main" xmlns="" id="{E3C7068E-D01A-4E3E-B8C1-55FF8AFF3342}"/>
-              </a:ext>
-            </a:extLst>
-          </p:cNvPr>
-          <p:cNvSpPr/>
-          <p:nvPr/>
-        </p:nvSpPr>
-        <p:spPr>
-          <a:xfrm>
-            <a:off x="9106246" y="608572"/>
-            <a:ext cx="2471017" cy="5408146"/>
-          </a:xfrm>
-          <a:prstGeom prst="rect">
-            <a:avLst/>
-          </a:prstGeom>
-          <a:noFill/>
-        </p:spPr>
-        <p:style>
-          <a:lnRef idx="2">
-            <a:schemeClr val="accent1">
-              <a:shade val="50000"/>
-            </a:schemeClr>
-          </a:lnRef>
-          <a:fillRef idx="1">
-            <a:schemeClr val="accent1"/>
-          </a:fillRef>
-          <a:effectRef idx="0">
-            <a:schemeClr val="accent1"/>
-          </a:effectRef>
-          <a:fontRef idx="minor">
-            <a:schemeClr val="lt1"/>
-          </a:fontRef>
-        </p:style>
-        <p:txBody>
-          <a:bodyPr rot="0" spcFirstLastPara="0" vertOverflow="overflow" horzOverflow="overflow" vert="horz" wrap="square" lIns="91440" tIns="45720" rIns="91440" bIns="45720" numCol="1" spcCol="0" rtlCol="0" fromWordArt="0" anchor="t" anchorCtr="0" forceAA="0" compatLnSpc="1">
-            <a:prstTxWarp prst="textNoShape">
-              <a:avLst/>
-            </a:prstTxWarp>
-            <a:noAutofit/>
-          </a:bodyPr>
-          <a:lstStyle/>
-          <a:p>
-            <a:r>
-              <a:rPr lang="en-SG" dirty="0" smtClean="0">
-                <a:solidFill>
-                  <a:schemeClr val="tx1"/>
-                </a:solidFill>
-              </a:rPr>
-              <a:t>Node – Value</a:t>
-            </a:r>
-          </a:p>
-          <a:p>
-            <a:r>
-              <a:rPr lang="en-SG" dirty="0" smtClean="0">
-                <a:solidFill>
-                  <a:schemeClr val="tx1"/>
-                </a:solidFill>
-              </a:rPr>
-              <a:t>Written value</a:t>
-            </a:r>
-          </a:p>
-          <a:p>
-            <a:r>
-              <a:rPr lang="en-SG" dirty="0" smtClean="0">
-                <a:solidFill>
-                  <a:schemeClr val="tx1"/>
-                </a:solidFill>
-              </a:rPr>
-              <a:t>Id – offset, offset, offset</a:t>
-            </a:r>
-          </a:p>
-          <a:p>
-            <a:endParaRPr lang="en-SG" dirty="0">
-              <a:solidFill>
-                <a:schemeClr val="tx1"/>
-              </a:solidFill>
-            </a:endParaRPr>
-          </a:p>
-          <a:p>
-            <a:endParaRPr lang="en-SG" dirty="0" smtClean="0">
-              <a:solidFill>
-                <a:schemeClr val="tx1"/>
-              </a:solidFill>
-            </a:endParaRPr>
-          </a:p>
-          <a:p>
-            <a:endParaRPr lang="en-SG" dirty="0">
-              <a:solidFill>
-                <a:schemeClr val="tx1"/>
-              </a:solidFill>
-            </a:endParaRPr>
-          </a:p>
-          <a:p>
-            <a:endParaRPr lang="en-SG" dirty="0" smtClean="0">
-              <a:solidFill>
-                <a:schemeClr val="tx1"/>
-              </a:solidFill>
-            </a:endParaRPr>
-          </a:p>
-          <a:p>
-            <a:r>
-              <a:rPr lang="en-SG" dirty="0" smtClean="0">
-                <a:solidFill>
-                  <a:schemeClr val="tx1"/>
-                </a:solidFill>
-              </a:rPr>
-              <a:t>------------------------------</a:t>
-            </a:r>
-          </a:p>
-          <a:p>
-            <a:r>
-              <a:rPr lang="en-US" dirty="0" smtClean="0">
-                <a:solidFill>
-                  <a:schemeClr val="tx1"/>
-                </a:solidFill>
-              </a:rPr>
-              <a:t> offset</a:t>
-            </a:r>
-            <a:endParaRPr lang="en-US" dirty="0">
-              <a:solidFill>
-                <a:schemeClr val="tx1"/>
-              </a:solidFill>
-            </a:endParaRPr>
-          </a:p>
-        </p:txBody>
-      </p:sp>
-    </p:spTree>
-    <p:extLst>
-      <p:ext uri="{BB962C8B-B14F-4D97-AF65-F5344CB8AC3E}">
-        <p14:creationId xmlns:p14="http://schemas.microsoft.com/office/powerpoint/2010/main" val="593825188"/>
       </p:ext>
     </p:extLst>
   </p:cSld>
@@ -4541,10 +4547,130 @@
       </p:grpSpPr>
       <p:sp>
         <p:nvSpPr>
+          <p:cNvPr id="4" name="Rectangle 3">
+            <a:extLst>
+              <a:ext uri="{FF2B5EF4-FFF2-40B4-BE49-F238E27FC236}">
+                <a16:creationId xmlns="" xmlns:a16="http://schemas.microsoft.com/office/drawing/2014/main" id="{E3C7068E-D01A-4E3E-B8C1-55FF8AFF3342}"/>
+              </a:ext>
+            </a:extLst>
+          </p:cNvPr>
+          <p:cNvSpPr/>
+          <p:nvPr/>
+        </p:nvSpPr>
+        <p:spPr>
+          <a:xfrm>
+            <a:off x="3333868" y="643333"/>
+            <a:ext cx="2399112" cy="5408146"/>
+          </a:xfrm>
+          <a:prstGeom prst="rect">
+            <a:avLst/>
+          </a:prstGeom>
+          <a:noFill/>
+        </p:spPr>
+        <p:style>
+          <a:lnRef idx="2">
+            <a:schemeClr val="accent1">
+              <a:shade val="50000"/>
+            </a:schemeClr>
+          </a:lnRef>
+          <a:fillRef idx="1">
+            <a:schemeClr val="accent1"/>
+          </a:fillRef>
+          <a:effectRef idx="0">
+            <a:schemeClr val="accent1"/>
+          </a:effectRef>
+          <a:fontRef idx="minor">
+            <a:schemeClr val="lt1"/>
+          </a:fontRef>
+        </p:style>
+        <p:txBody>
+          <a:bodyPr rot="0" spcFirstLastPara="0" vertOverflow="overflow" horzOverflow="overflow" vert="horz" wrap="square" lIns="91440" tIns="45720" rIns="91440" bIns="45720" numCol="1" spcCol="0" rtlCol="0" fromWordArt="0" anchor="t" anchorCtr="0" forceAA="0" compatLnSpc="1">
+            <a:prstTxWarp prst="textNoShape">
+              <a:avLst/>
+            </a:prstTxWarp>
+            <a:noAutofit/>
+          </a:bodyPr>
+          <a:lstStyle/>
+          <a:p>
+            <a:r>
+              <a:rPr lang="en-SG" dirty="0">
+                <a:solidFill>
+                  <a:schemeClr val="tx1"/>
+                </a:solidFill>
+              </a:rPr>
+              <a:t>Variable </a:t>
+            </a:r>
+            <a:r>
+              <a:rPr lang="en-SG" dirty="0" smtClean="0">
+                <a:solidFill>
+                  <a:schemeClr val="tx1"/>
+                </a:solidFill>
+              </a:rPr>
+              <a:t>- Node</a:t>
+            </a:r>
+          </a:p>
+          <a:p>
+            <a:r>
+              <a:rPr lang="en-SG" dirty="0" smtClean="0">
+                <a:solidFill>
+                  <a:schemeClr val="tx1"/>
+                </a:solidFill>
+              </a:rPr>
+              <a:t>------------------------------</a:t>
+            </a:r>
+          </a:p>
+          <a:p>
+            <a:r>
+              <a:rPr lang="en-SG" dirty="0" smtClean="0">
+                <a:solidFill>
+                  <a:schemeClr val="tx1"/>
+                </a:solidFill>
+              </a:rPr>
+              <a:t>Node – PR </a:t>
+            </a:r>
+          </a:p>
+          <a:p>
+            <a:r>
+              <a:rPr lang="en-SG" dirty="0" smtClean="0">
+                <a:solidFill>
+                  <a:schemeClr val="tx1"/>
+                </a:solidFill>
+              </a:rPr>
+              <a:t>Node – CO</a:t>
+            </a:r>
+          </a:p>
+          <a:p>
+            <a:r>
+              <a:rPr lang="en-SG" dirty="0" smtClean="0">
+                <a:solidFill>
+                  <a:schemeClr val="tx1"/>
+                </a:solidFill>
+              </a:rPr>
+              <a:t>Node – DEF</a:t>
+            </a:r>
+          </a:p>
+          <a:p>
+            <a:endParaRPr lang="en-SG" dirty="0" smtClean="0">
+              <a:solidFill>
+                <a:schemeClr val="tx1"/>
+              </a:solidFill>
+            </a:endParaRPr>
+          </a:p>
+          <a:p>
+            <a:endParaRPr lang="en-US" dirty="0">
+              <a:solidFill>
+                <a:schemeClr val="tx1"/>
+              </a:solidFill>
+            </a:endParaRPr>
+          </a:p>
+        </p:txBody>
+      </p:sp>
+      <p:sp>
+        <p:nvSpPr>
           <p:cNvPr id="5" name="Rectangle 4">
             <a:extLst>
               <a:ext uri="{FF2B5EF4-FFF2-40B4-BE49-F238E27FC236}">
-                <a16:creationId xmlns:a16="http://schemas.microsoft.com/office/drawing/2014/main" xmlns="" id="{E3C7068E-D01A-4E3E-B8C1-55FF8AFF3342}"/>
+                <a16:creationId xmlns="" xmlns:a16="http://schemas.microsoft.com/office/drawing/2014/main" id="{E3C7068E-D01A-4E3E-B8C1-55FF8AFF3342}"/>
               </a:ext>
             </a:extLst>
           </p:cNvPr>
@@ -4587,13 +4713,79 @@
           <a:lstStyle/>
           <a:p>
             <a:r>
+              <a:rPr lang="en-SG" dirty="0" smtClean="0">
+                <a:solidFill>
+                  <a:schemeClr val="tx1"/>
+                </a:solidFill>
+              </a:rPr>
+              <a:t>Node - Variable</a:t>
+            </a:r>
+          </a:p>
+          <a:p>
+            <a:r>
+              <a:rPr lang="en-SG" dirty="0" smtClean="0">
+                <a:solidFill>
+                  <a:schemeClr val="tx1"/>
+                </a:solidFill>
+              </a:rPr>
+              <a:t>------------------------------</a:t>
+            </a:r>
+          </a:p>
+          <a:p>
+            <a:r>
               <a:rPr lang="en-SG" dirty="0" err="1" smtClean="0">
                 <a:solidFill>
                   <a:schemeClr val="tx1"/>
                 </a:solidFill>
               </a:rPr>
-              <a:t>VariableStore</a:t>
-            </a:r>
+              <a:t>Var</a:t>
+            </a:r>
+            <a:r>
+              <a:rPr lang="en-SG" dirty="0" smtClean="0">
+                <a:solidFill>
+                  <a:schemeClr val="tx1"/>
+                </a:solidFill>
+              </a:rPr>
+              <a:t> – PR</a:t>
+            </a:r>
+          </a:p>
+          <a:p>
+            <a:r>
+              <a:rPr lang="en-SG" dirty="0" err="1" smtClean="0">
+                <a:solidFill>
+                  <a:schemeClr val="tx1"/>
+                </a:solidFill>
+              </a:rPr>
+              <a:t>Var</a:t>
+            </a:r>
+            <a:r>
+              <a:rPr lang="en-SG" dirty="0" smtClean="0">
+                <a:solidFill>
+                  <a:schemeClr val="tx1"/>
+                </a:solidFill>
+              </a:rPr>
+              <a:t> – CO</a:t>
+            </a:r>
+          </a:p>
+          <a:p>
+            <a:r>
+              <a:rPr lang="en-SG" dirty="0" err="1" smtClean="0">
+                <a:solidFill>
+                  <a:schemeClr val="tx1"/>
+                </a:solidFill>
+              </a:rPr>
+              <a:t>Var</a:t>
+            </a:r>
+            <a:r>
+              <a:rPr lang="en-SG" dirty="0" smtClean="0">
+                <a:solidFill>
+                  <a:schemeClr val="tx1"/>
+                </a:solidFill>
+              </a:rPr>
+              <a:t> – DEF</a:t>
+            </a:r>
+          </a:p>
+          <a:p>
             <a:endParaRPr lang="en-SG" dirty="0" smtClean="0">
               <a:solidFill>
                 <a:schemeClr val="tx1"/>
@@ -4601,39 +4793,196 @@
             </a:endParaRPr>
           </a:p>
           <a:p>
+            <a:endParaRPr lang="en-US" dirty="0">
+              <a:solidFill>
+                <a:schemeClr val="tx1"/>
+              </a:solidFill>
+            </a:endParaRPr>
+          </a:p>
+        </p:txBody>
+      </p:sp>
+      <p:sp>
+        <p:nvSpPr>
+          <p:cNvPr id="6" name="Rectangle 5">
+            <a:extLst>
+              <a:ext uri="{FF2B5EF4-FFF2-40B4-BE49-F238E27FC236}">
+                <a16:creationId xmlns="" xmlns:a16="http://schemas.microsoft.com/office/drawing/2014/main" id="{E3C7068E-D01A-4E3E-B8C1-55FF8AFF3342}"/>
+              </a:ext>
+            </a:extLst>
+          </p:cNvPr>
+          <p:cNvSpPr/>
+          <p:nvPr/>
+        </p:nvSpPr>
+        <p:spPr>
+          <a:xfrm>
+            <a:off x="6149000" y="608572"/>
+            <a:ext cx="2471017" cy="5408146"/>
+          </a:xfrm>
+          <a:prstGeom prst="rect">
+            <a:avLst/>
+          </a:prstGeom>
+          <a:noFill/>
+        </p:spPr>
+        <p:style>
+          <a:lnRef idx="2">
+            <a:schemeClr val="accent1">
+              <a:shade val="50000"/>
+            </a:schemeClr>
+          </a:lnRef>
+          <a:fillRef idx="1">
+            <a:schemeClr val="accent1"/>
+          </a:fillRef>
+          <a:effectRef idx="0">
+            <a:schemeClr val="accent1"/>
+          </a:effectRef>
+          <a:fontRef idx="minor">
+            <a:schemeClr val="lt1"/>
+          </a:fontRef>
+        </p:style>
+        <p:txBody>
+          <a:bodyPr rot="0" spcFirstLastPara="0" vertOverflow="overflow" horzOverflow="overflow" vert="horz" wrap="square" lIns="91440" tIns="45720" rIns="91440" bIns="45720" numCol="1" spcCol="0" rtlCol="0" fromWordArt="0" anchor="t" anchorCtr="0" forceAA="0" compatLnSpc="1">
+            <a:prstTxWarp prst="textNoShape">
+              <a:avLst/>
+            </a:prstTxWarp>
+            <a:noAutofit/>
+          </a:bodyPr>
+          <a:lstStyle/>
+          <a:p>
             <a:r>
               <a:rPr lang="en-SG" dirty="0" smtClean="0">
                 <a:solidFill>
                   <a:schemeClr val="tx1"/>
                 </a:solidFill>
               </a:rPr>
+              <a:t>Value</a:t>
+            </a:r>
+          </a:p>
+          <a:p>
+            <a:r>
+              <a:rPr lang="en-SG" dirty="0" smtClean="0">
+                <a:solidFill>
+                  <a:schemeClr val="tx1"/>
+                </a:solidFill>
+              </a:rPr>
               <a:t>------------------------------</a:t>
             </a:r>
           </a:p>
           <a:p>
             <a:r>
+              <a:rPr lang="en-US" dirty="0" smtClean="0">
+                <a:solidFill>
+                  <a:schemeClr val="tx1"/>
+                </a:solidFill>
+              </a:rPr>
+              <a:t>Offset</a:t>
+            </a:r>
+          </a:p>
+          <a:p>
+            <a:r>
+              <a:rPr lang="en-US" dirty="0" smtClean="0">
+                <a:solidFill>
+                  <a:schemeClr val="tx1"/>
+                </a:solidFill>
+              </a:rPr>
+              <a:t>String </a:t>
+            </a:r>
+            <a:r>
+              <a:rPr lang="en-US" dirty="0" err="1" smtClean="0">
+                <a:solidFill>
+                  <a:schemeClr val="tx1"/>
+                </a:solidFill>
+              </a:rPr>
+              <a:t>varId</a:t>
+            </a:r>
+            <a:endParaRPr lang="en-US" dirty="0" smtClean="0">
+              <a:solidFill>
+                <a:schemeClr val="tx1"/>
+              </a:solidFill>
+            </a:endParaRPr>
+          </a:p>
+          <a:p>
+            <a:r>
+              <a:rPr lang="en-US" dirty="0" smtClean="0">
+                <a:solidFill>
+                  <a:schemeClr val="tx1"/>
+                </a:solidFill>
+              </a:rPr>
+              <a:t>Parent</a:t>
+            </a:r>
+          </a:p>
+          <a:p>
+            <a:endParaRPr lang="en-US" dirty="0">
+              <a:solidFill>
+                <a:schemeClr val="tx1"/>
+              </a:solidFill>
+            </a:endParaRPr>
+          </a:p>
+        </p:txBody>
+      </p:sp>
+      <p:sp>
+        <p:nvSpPr>
+          <p:cNvPr id="7" name="Rectangle 6">
+            <a:extLst>
+              <a:ext uri="{FF2B5EF4-FFF2-40B4-BE49-F238E27FC236}">
+                <a16:creationId xmlns="" xmlns:a16="http://schemas.microsoft.com/office/drawing/2014/main" id="{E3C7068E-D01A-4E3E-B8C1-55FF8AFF3342}"/>
+              </a:ext>
+            </a:extLst>
+          </p:cNvPr>
+          <p:cNvSpPr/>
+          <p:nvPr/>
+        </p:nvSpPr>
+        <p:spPr>
+          <a:xfrm>
+            <a:off x="9106246" y="608572"/>
+            <a:ext cx="2471017" cy="5408146"/>
+          </a:xfrm>
+          <a:prstGeom prst="rect">
+            <a:avLst/>
+          </a:prstGeom>
+          <a:noFill/>
+        </p:spPr>
+        <p:style>
+          <a:lnRef idx="2">
+            <a:schemeClr val="accent1">
+              <a:shade val="50000"/>
+            </a:schemeClr>
+          </a:lnRef>
+          <a:fillRef idx="1">
+            <a:schemeClr val="accent1"/>
+          </a:fillRef>
+          <a:effectRef idx="0">
+            <a:schemeClr val="accent1"/>
+          </a:effectRef>
+          <a:fontRef idx="minor">
+            <a:schemeClr val="lt1"/>
+          </a:fontRef>
+        </p:style>
+        <p:txBody>
+          <a:bodyPr rot="0" spcFirstLastPara="0" vertOverflow="overflow" horzOverflow="overflow" vert="horz" wrap="square" lIns="91440" tIns="45720" rIns="91440" bIns="45720" numCol="1" spcCol="0" rtlCol="0" fromWordArt="0" anchor="t" anchorCtr="0" forceAA="0" compatLnSpc="1">
+            <a:prstTxWarp prst="textNoShape">
+              <a:avLst/>
+            </a:prstTxWarp>
+            <a:noAutofit/>
+          </a:bodyPr>
+          <a:lstStyle/>
+          <a:p>
+            <a:r>
               <a:rPr lang="en-SG" dirty="0" smtClean="0">
                 <a:solidFill>
                   <a:schemeClr val="tx1"/>
                 </a:solidFill>
               </a:rPr>
-              <a:t>Map&lt;</a:t>
-            </a:r>
-            <a:r>
-              <a:rPr lang="en-SG" dirty="0" err="1" smtClean="0">
-                <a:solidFill>
-                  <a:schemeClr val="tx1"/>
-                </a:solidFill>
-              </a:rPr>
-              <a:t>VarId</a:t>
-            </a:r>
+              <a:t>Node – Value</a:t>
+            </a:r>
+          </a:p>
+          <a:p>
             <a:r>
               <a:rPr lang="en-SG" dirty="0" smtClean="0">
                 <a:solidFill>
                   <a:schemeClr val="tx1"/>
                 </a:solidFill>
               </a:rPr>
-              <a:t>, Variable&gt;</a:t>
+              <a:t>Written value</a:t>
             </a:r>
           </a:p>
           <a:p>
@@ -4643,8 +4992,15 @@
                   <a:schemeClr val="tx1"/>
                 </a:solidFill>
               </a:rPr>
-              <a:t>Variable</a:t>
-            </a:r>
+              <a:t>Id – offset, offset, offset</a:t>
+            </a:r>
+          </a:p>
+          <a:p>
+            <a:endParaRPr lang="en-SG" dirty="0">
+              <a:solidFill>
+                <a:schemeClr val="tx1"/>
+              </a:solidFill>
+            </a:endParaRPr>
           </a:p>
           <a:p>
             <a:endParaRPr lang="en-SG" dirty="0" smtClean="0">
@@ -4654,22 +5010,6 @@
             </a:endParaRPr>
           </a:p>
           <a:p>
-            <a:r>
-              <a:rPr lang="en-SG" dirty="0">
-                <a:solidFill>
-                  <a:schemeClr val="tx1"/>
-                </a:solidFill>
-              </a:rPr>
-              <a:t>//get or </a:t>
-            </a:r>
-            <a:r>
-              <a:rPr lang="en-SG" dirty="0" smtClean="0">
-                <a:solidFill>
-                  <a:schemeClr val="tx1"/>
-                </a:solidFill>
-              </a:rPr>
-              <a:t>create</a:t>
-            </a:r>
             <a:endParaRPr lang="en-SG" dirty="0">
               <a:solidFill>
                 <a:schemeClr val="tx1"/>
@@ -4677,40 +5017,6 @@
             </a:endParaRPr>
           </a:p>
           <a:p>
-            <a:r>
-              <a:rPr lang="en-SG" dirty="0" err="1" smtClean="0">
-                <a:solidFill>
-                  <a:schemeClr val="tx1"/>
-                </a:solidFill>
-              </a:rPr>
-              <a:t>loadVariable</a:t>
-            </a:r>
-            <a:r>
-              <a:rPr lang="en-SG" dirty="0" smtClean="0">
-                <a:solidFill>
-                  <a:schemeClr val="tx1"/>
-                </a:solidFill>
-              </a:rPr>
-              <a:t>(</a:t>
-            </a:r>
-            <a:r>
-              <a:rPr lang="en-SG" dirty="0" err="1" smtClean="0">
-                <a:solidFill>
-                  <a:schemeClr val="tx1"/>
-                </a:solidFill>
-              </a:rPr>
-              <a:t>VarId</a:t>
-            </a:r>
-            <a:r>
-              <a:rPr lang="en-SG" dirty="0" smtClean="0">
-                <a:solidFill>
-                  <a:schemeClr val="tx1"/>
-                </a:solidFill>
-              </a:rPr>
-              <a:t>)</a:t>
-            </a:r>
-          </a:p>
-          <a:p>
             <a:endParaRPr lang="en-SG" dirty="0" smtClean="0">
               <a:solidFill>
                 <a:schemeClr val="tx1"/>
@@ -4718,6 +5024,124 @@
             </a:endParaRPr>
           </a:p>
           <a:p>
+            <a:r>
+              <a:rPr lang="en-SG" dirty="0" smtClean="0">
+                <a:solidFill>
+                  <a:schemeClr val="tx1"/>
+                </a:solidFill>
+              </a:rPr>
+              <a:t>------------------------------</a:t>
+            </a:r>
+          </a:p>
+          <a:p>
+            <a:r>
+              <a:rPr lang="en-US" dirty="0" smtClean="0">
+                <a:solidFill>
+                  <a:schemeClr val="tx1"/>
+                </a:solidFill>
+              </a:rPr>
+              <a:t> offset</a:t>
+            </a:r>
+            <a:endParaRPr lang="en-US" dirty="0">
+              <a:solidFill>
+                <a:schemeClr val="tx1"/>
+              </a:solidFill>
+            </a:endParaRPr>
+          </a:p>
+        </p:txBody>
+      </p:sp>
+    </p:spTree>
+    <p:extLst>
+      <p:ext uri="{BB962C8B-B14F-4D97-AF65-F5344CB8AC3E}">
+        <p14:creationId xmlns:p14="http://schemas.microsoft.com/office/powerpoint/2010/main" val="593825188"/>
+      </p:ext>
+    </p:extLst>
+  </p:cSld>
+  <p:clrMapOvr>
+    <a:masterClrMapping/>
+  </p:clrMapOvr>
+  <p:timing>
+    <p:tnLst>
+      <p:par>
+        <p:cTn id="1" dur="indefinite" restart="never" nodeType="tmRoot"/>
+      </p:par>
+    </p:tnLst>
+  </p:timing>
+</p:sld>
+</file>
+
+<file path=ppt/slides/slide13.xml><?xml version="1.0" encoding="utf-8"?>
+<p:sld xmlns:a="http://schemas.openxmlformats.org/drawingml/2006/main" xmlns:r="http://schemas.openxmlformats.org/officeDocument/2006/relationships" xmlns:p="http://schemas.openxmlformats.org/presentationml/2006/main">
+  <p:cSld>
+    <p:spTree>
+      <p:nvGrpSpPr>
+        <p:cNvPr id="1" name=""/>
+        <p:cNvGrpSpPr/>
+        <p:nvPr/>
+      </p:nvGrpSpPr>
+      <p:grpSpPr>
+        <a:xfrm>
+          <a:off x="0" y="0"/>
+          <a:ext cx="0" cy="0"/>
+          <a:chOff x="0" y="0"/>
+          <a:chExt cx="0" cy="0"/>
+        </a:xfrm>
+      </p:grpSpPr>
+      <p:sp>
+        <p:nvSpPr>
+          <p:cNvPr id="5" name="Rectangle 4">
+            <a:extLst>
+              <a:ext uri="{FF2B5EF4-FFF2-40B4-BE49-F238E27FC236}">
+                <a16:creationId xmlns="" xmlns:a16="http://schemas.microsoft.com/office/drawing/2014/main" id="{E3C7068E-D01A-4E3E-B8C1-55FF8AFF3342}"/>
+              </a:ext>
+            </a:extLst>
+          </p:cNvPr>
+          <p:cNvSpPr/>
+          <p:nvPr/>
+        </p:nvSpPr>
+        <p:spPr>
+          <a:xfrm>
+            <a:off x="522104" y="643333"/>
+            <a:ext cx="2477950" cy="5408146"/>
+          </a:xfrm>
+          <a:prstGeom prst="rect">
+            <a:avLst/>
+          </a:prstGeom>
+          <a:noFill/>
+        </p:spPr>
+        <p:style>
+          <a:lnRef idx="2">
+            <a:schemeClr val="accent1">
+              <a:shade val="50000"/>
+            </a:schemeClr>
+          </a:lnRef>
+          <a:fillRef idx="1">
+            <a:schemeClr val="accent1"/>
+          </a:fillRef>
+          <a:effectRef idx="0">
+            <a:schemeClr val="accent1"/>
+          </a:effectRef>
+          <a:fontRef idx="minor">
+            <a:schemeClr val="lt1"/>
+          </a:fontRef>
+        </p:style>
+        <p:txBody>
+          <a:bodyPr rot="0" spcFirstLastPara="0" vertOverflow="overflow" horzOverflow="overflow" vert="horz" wrap="square" lIns="91440" tIns="45720" rIns="91440" bIns="45720" numCol="1" spcCol="0" rtlCol="0" fromWordArt="0" anchor="t" anchorCtr="0" forceAA="0" compatLnSpc="1">
+            <a:prstTxWarp prst="textNoShape">
+              <a:avLst/>
+            </a:prstTxWarp>
+            <a:noAutofit/>
+          </a:bodyPr>
+          <a:lstStyle/>
+          <a:p>
+            <a:r>
+              <a:rPr lang="en-SG" dirty="0" err="1" smtClean="0">
+                <a:solidFill>
+                  <a:schemeClr val="tx1"/>
+                </a:solidFill>
+              </a:rPr>
+              <a:t>VariableStore</a:t>
+            </a:r>
             <a:endParaRPr lang="en-SG" dirty="0" smtClean="0">
               <a:solidFill>
                 <a:schemeClr val="tx1"/>
@@ -4725,6 +5149,130 @@
             </a:endParaRPr>
           </a:p>
           <a:p>
+            <a:r>
+              <a:rPr lang="en-SG" dirty="0" smtClean="0">
+                <a:solidFill>
+                  <a:schemeClr val="tx1"/>
+                </a:solidFill>
+              </a:rPr>
+              <a:t>------------------------------</a:t>
+            </a:r>
+          </a:p>
+          <a:p>
+            <a:r>
+              <a:rPr lang="en-SG" dirty="0" smtClean="0">
+                <a:solidFill>
+                  <a:schemeClr val="tx1"/>
+                </a:solidFill>
+              </a:rPr>
+              <a:t>Map&lt;</a:t>
+            </a:r>
+            <a:r>
+              <a:rPr lang="en-SG" dirty="0" err="1" smtClean="0">
+                <a:solidFill>
+                  <a:schemeClr val="tx1"/>
+                </a:solidFill>
+              </a:rPr>
+              <a:t>VarId</a:t>
+            </a:r>
+            <a:r>
+              <a:rPr lang="en-SG" dirty="0" smtClean="0">
+                <a:solidFill>
+                  <a:schemeClr val="tx1"/>
+                </a:solidFill>
+              </a:rPr>
+              <a:t>, Variable&gt;</a:t>
+            </a:r>
+          </a:p>
+          <a:p>
+            <a:r>
+              <a:rPr lang="en-SG" dirty="0" smtClean="0">
+                <a:solidFill>
+                  <a:schemeClr val="tx1"/>
+                </a:solidFill>
+              </a:rPr>
+              <a:t>Variable</a:t>
+            </a:r>
+          </a:p>
+          <a:p>
+            <a:endParaRPr lang="en-SG" dirty="0" smtClean="0">
+              <a:solidFill>
+                <a:schemeClr val="tx1"/>
+              </a:solidFill>
+            </a:endParaRPr>
+          </a:p>
+          <a:p>
+            <a:r>
+              <a:rPr lang="en-SG" dirty="0">
+                <a:solidFill>
+                  <a:schemeClr val="tx1"/>
+                </a:solidFill>
+              </a:rPr>
+              <a:t>//get or </a:t>
+            </a:r>
+            <a:r>
+              <a:rPr lang="en-SG" dirty="0" smtClean="0">
+                <a:solidFill>
+                  <a:schemeClr val="tx1"/>
+                </a:solidFill>
+              </a:rPr>
+              <a:t>create</a:t>
+            </a:r>
+            <a:endParaRPr lang="en-SG" dirty="0">
+              <a:solidFill>
+                <a:schemeClr val="tx1"/>
+              </a:solidFill>
+            </a:endParaRPr>
+          </a:p>
+          <a:p>
+            <a:r>
+              <a:rPr lang="en-SG" dirty="0" err="1" smtClean="0">
+                <a:solidFill>
+                  <a:schemeClr val="tx1"/>
+                </a:solidFill>
+              </a:rPr>
+              <a:t>loadVariable</a:t>
+            </a:r>
+            <a:r>
+              <a:rPr lang="en-SG" dirty="0" smtClean="0">
+                <a:solidFill>
+                  <a:schemeClr val="tx1"/>
+                </a:solidFill>
+              </a:rPr>
+              <a:t>(</a:t>
+            </a:r>
+            <a:r>
+              <a:rPr lang="en-SG" dirty="0" err="1" smtClean="0">
+                <a:solidFill>
+                  <a:schemeClr val="tx1"/>
+                </a:solidFill>
+              </a:rPr>
+              <a:t>VarId</a:t>
+            </a:r>
+            <a:r>
+              <a:rPr lang="en-SG" dirty="0" smtClean="0">
+                <a:solidFill>
+                  <a:schemeClr val="tx1"/>
+                </a:solidFill>
+              </a:rPr>
+              <a:t>)</a:t>
+            </a:r>
+          </a:p>
+          <a:p>
+            <a:endParaRPr lang="en-SG" dirty="0" smtClean="0">
+              <a:solidFill>
+                <a:schemeClr val="tx1"/>
+              </a:solidFill>
+            </a:endParaRPr>
+          </a:p>
+          <a:p>
+            <a:endParaRPr lang="en-SG" dirty="0" smtClean="0">
+              <a:solidFill>
+                <a:schemeClr val="tx1"/>
+              </a:solidFill>
+            </a:endParaRPr>
+          </a:p>
+          <a:p>
             <a:endParaRPr lang="en-US" dirty="0">
               <a:solidFill>
                 <a:schemeClr val="tx1"/>
@@ -4738,7 +5286,7 @@
           <p:cNvPr id="6" name="Rectangle 5">
             <a:extLst>
               <a:ext uri="{FF2B5EF4-FFF2-40B4-BE49-F238E27FC236}">
-                <a16:creationId xmlns:a16="http://schemas.microsoft.com/office/drawing/2014/main" xmlns="" id="{E3C7068E-D01A-4E3E-B8C1-55FF8AFF3342}"/>
+                <a16:creationId xmlns="" xmlns:a16="http://schemas.microsoft.com/office/drawing/2014/main" id="{E3C7068E-D01A-4E3E-B8C1-55FF8AFF3342}"/>
               </a:ext>
             </a:extLst>
           </p:cNvPr>
@@ -4856,7 +5404,7 @@
           <p:cNvPr id="7" name="Rectangle 6">
             <a:extLst>
               <a:ext uri="{FF2B5EF4-FFF2-40B4-BE49-F238E27FC236}">
-                <a16:creationId xmlns:a16="http://schemas.microsoft.com/office/drawing/2014/main" xmlns="" id="{E3C7068E-D01A-4E3E-B8C1-55FF8AFF3342}"/>
+                <a16:creationId xmlns="" xmlns:a16="http://schemas.microsoft.com/office/drawing/2014/main" id="{E3C7068E-D01A-4E3E-B8C1-55FF8AFF3342}"/>
               </a:ext>
             </a:extLst>
           </p:cNvPr>
@@ -5288,7 +5836,7 @@
           <p:cNvPr id="2" name="Title 1">
             <a:extLst>
               <a:ext uri="{FF2B5EF4-FFF2-40B4-BE49-F238E27FC236}">
-                <a16:creationId xmlns:a16="http://schemas.microsoft.com/office/drawing/2014/main" xmlns="" id="{12BA8C6B-F366-4C78-8506-30A422E36420}"/>
+                <a16:creationId xmlns="" xmlns:a16="http://schemas.microsoft.com/office/drawing/2014/main" id="{12BA8C6B-F366-4C78-8506-30A422E36420}"/>
               </a:ext>
             </a:extLst>
           </p:cNvPr>
@@ -5317,7 +5865,7 @@
           <p:cNvPr id="3" name="Content Placeholder 2">
             <a:extLst>
               <a:ext uri="{FF2B5EF4-FFF2-40B4-BE49-F238E27FC236}">
-                <a16:creationId xmlns:a16="http://schemas.microsoft.com/office/drawing/2014/main" xmlns="" id="{7D57C60D-D46C-4886-B681-BA9FD0A42C1A}"/>
+                <a16:creationId xmlns="" xmlns:a16="http://schemas.microsoft.com/office/drawing/2014/main" id="{7D57C60D-D46C-4886-B681-BA9FD0A42C1A}"/>
               </a:ext>
             </a:extLst>
           </p:cNvPr>
@@ -6591,13 +7139,7 @@
       </p:grpSpPr>
       <p:sp>
         <p:nvSpPr>
-          <p:cNvPr id="2" name="Title 1">
-            <a:extLst>
-              <a:ext uri="{FF2B5EF4-FFF2-40B4-BE49-F238E27FC236}">
-                <a16:creationId xmlns:a16="http://schemas.microsoft.com/office/drawing/2014/main" xmlns="" id="{F05026DD-7683-43F6-B478-BE4834E5B2E4}"/>
-              </a:ext>
-            </a:extLst>
-          </p:cNvPr>
+          <p:cNvPr id="2" name="Title 1"/>
           <p:cNvSpPr>
             <a:spLocks noGrp="1"/>
           </p:cNvSpPr>
@@ -6610,23 +7152,13 @@
           <a:bodyPr/>
           <a:lstStyle/>
           <a:p>
-            <a:r>
-              <a:rPr lang="en-SG" dirty="0"/>
-              <a:t>Technical Details on Trace Storage	</a:t>
-            </a:r>
-            <a:endParaRPr lang="en-US" dirty="0"/>
-          </a:p>
-        </p:txBody>
-      </p:sp>
-      <p:sp>
-        <p:nvSpPr>
-          <p:cNvPr id="3" name="Content Placeholder 2">
-            <a:extLst>
-              <a:ext uri="{FF2B5EF4-FFF2-40B4-BE49-F238E27FC236}">
-                <a16:creationId xmlns:a16="http://schemas.microsoft.com/office/drawing/2014/main" xmlns="" id="{71F4E548-C7D9-49BB-AC24-E3B6E7F8C0F0}"/>
-              </a:ext>
-            </a:extLst>
-          </p:cNvPr>
+            <a:endParaRPr lang="en-US"/>
+          </a:p>
+        </p:txBody>
+      </p:sp>
+      <p:sp>
+        <p:nvSpPr>
+          <p:cNvPr id="3" name="Content Placeholder 2"/>
           <p:cNvSpPr>
             <a:spLocks noGrp="1"/>
           </p:cNvSpPr>
@@ -6634,6 +7166,164 @@
             <p:ph idx="1"/>
           </p:nvPr>
         </p:nvSpPr>
+        <p:spPr/>
+        <p:txBody>
+          <a:bodyPr/>
+          <a:lstStyle/>
+          <a:p>
+            <a:r>
+              <a:rPr lang="en-US" dirty="0"/>
+              <a:t>@</a:t>
+            </a:r>
+            <a:r>
+              <a:rPr lang="en-US" dirty="0" err="1"/>
+              <a:t>lylytran</a:t>
+            </a:r>
+            <a:r>
+              <a:rPr lang="en-US" dirty="0"/>
+              <a:t> hi </a:t>
+            </a:r>
+            <a:r>
+              <a:rPr lang="en-US" dirty="0" err="1"/>
+              <a:t>lyly</a:t>
+            </a:r>
+            <a:r>
+              <a:rPr lang="en-US" dirty="0"/>
+              <a:t>, thanks a lot for your design on </a:t>
+            </a:r>
+            <a:r>
+              <a:rPr lang="en-US" dirty="0" err="1"/>
+              <a:t>microbat</a:t>
+            </a:r>
+            <a:r>
+              <a:rPr lang="en-US" dirty="0"/>
+              <a:t>, we went through you slides. I agree that we should reconstruct data/control/call relations after execution. The *on-demand* construction may also be an option</a:t>
+            </a:r>
+            <a:r>
+              <a:rPr lang="en-US" dirty="0" smtClean="0"/>
+              <a:t>.</a:t>
+            </a:r>
+          </a:p>
+          <a:p>
+            <a:r>
+              <a:rPr lang="en-US" dirty="0" smtClean="0"/>
+              <a:t>however</a:t>
+            </a:r>
+            <a:r>
+              <a:rPr lang="en-US" dirty="0"/>
+              <a:t>, we have some confusion on your concept like </a:t>
+            </a:r>
+            <a:r>
+              <a:rPr lang="en-US" dirty="0" err="1"/>
+              <a:t>tracebridge</a:t>
+            </a:r>
+            <a:r>
+              <a:rPr lang="en-US" dirty="0"/>
+              <a:t>. moreover, our design should conform to potential partial recording, this challenges call relation. once some trace execution is missing, how can we recover the call </a:t>
+            </a:r>
+            <a:r>
+              <a:rPr lang="en-US"/>
+              <a:t>relation</a:t>
+            </a:r>
+            <a:r>
+              <a:rPr lang="en-US" smtClean="0"/>
+              <a:t>.</a:t>
+            </a:r>
+          </a:p>
+          <a:p>
+            <a:r>
+              <a:rPr lang="en-US" smtClean="0"/>
+              <a:t>do </a:t>
+            </a:r>
+            <a:r>
+              <a:rPr lang="en-US" dirty="0"/>
+              <a:t>you have time tomorrow 1pm? please kindly let me know if you would like to discuss on a more convenient time for you.</a:t>
+            </a:r>
+          </a:p>
+        </p:txBody>
+      </p:sp>
+    </p:spTree>
+    <p:extLst>
+      <p:ext uri="{BB962C8B-B14F-4D97-AF65-F5344CB8AC3E}">
+        <p14:creationId xmlns:p14="http://schemas.microsoft.com/office/powerpoint/2010/main" val="491231535"/>
+      </p:ext>
+    </p:extLst>
+  </p:cSld>
+  <p:clrMapOvr>
+    <a:masterClrMapping/>
+  </p:clrMapOvr>
+  <p:timing>
+    <p:tnLst>
+      <p:par>
+        <p:cTn id="1" dur="indefinite" restart="never" nodeType="tmRoot"/>
+      </p:par>
+    </p:tnLst>
+  </p:timing>
+</p:sld>
+</file>
+
+<file path=ppt/slides/slide8.xml><?xml version="1.0" encoding="utf-8"?>
+<p:sld xmlns:a="http://schemas.openxmlformats.org/drawingml/2006/main" xmlns:r="http://schemas.openxmlformats.org/officeDocument/2006/relationships" xmlns:p="http://schemas.openxmlformats.org/presentationml/2006/main">
+  <p:cSld>
+    <p:spTree>
+      <p:nvGrpSpPr>
+        <p:cNvPr id="1" name=""/>
+        <p:cNvGrpSpPr/>
+        <p:nvPr/>
+      </p:nvGrpSpPr>
+      <p:grpSpPr>
+        <a:xfrm>
+          <a:off x="0" y="0"/>
+          <a:ext cx="0" cy="0"/>
+          <a:chOff x="0" y="0"/>
+          <a:chExt cx="0" cy="0"/>
+        </a:xfrm>
+      </p:grpSpPr>
+      <p:sp>
+        <p:nvSpPr>
+          <p:cNvPr id="2" name="Title 1">
+            <a:extLst>
+              <a:ext uri="{FF2B5EF4-FFF2-40B4-BE49-F238E27FC236}">
+                <a16:creationId xmlns="" xmlns:a16="http://schemas.microsoft.com/office/drawing/2014/main" id="{F05026DD-7683-43F6-B478-BE4834E5B2E4}"/>
+              </a:ext>
+            </a:extLst>
+          </p:cNvPr>
+          <p:cNvSpPr>
+            <a:spLocks noGrp="1"/>
+          </p:cNvSpPr>
+          <p:nvPr>
+            <p:ph type="title"/>
+          </p:nvPr>
+        </p:nvSpPr>
+        <p:spPr/>
+        <p:txBody>
+          <a:bodyPr/>
+          <a:lstStyle/>
+          <a:p>
+            <a:r>
+              <a:rPr lang="en-SG" dirty="0"/>
+              <a:t>Technical Details on Trace Storage	</a:t>
+            </a:r>
+            <a:endParaRPr lang="en-US" dirty="0"/>
+          </a:p>
+        </p:txBody>
+      </p:sp>
+      <p:sp>
+        <p:nvSpPr>
+          <p:cNvPr id="3" name="Content Placeholder 2">
+            <a:extLst>
+              <a:ext uri="{FF2B5EF4-FFF2-40B4-BE49-F238E27FC236}">
+                <a16:creationId xmlns="" xmlns:a16="http://schemas.microsoft.com/office/drawing/2014/main" id="{71F4E548-C7D9-49BB-AC24-E3B6E7F8C0F0}"/>
+              </a:ext>
+            </a:extLst>
+          </p:cNvPr>
+          <p:cNvSpPr>
+            <a:spLocks noGrp="1"/>
+          </p:cNvSpPr>
+          <p:nvPr>
+            <p:ph idx="1"/>
+          </p:nvPr>
+        </p:nvSpPr>
         <p:spPr>
           <a:xfrm>
             <a:off x="838200" y="1825625"/>
@@ -6663,7 +7353,7 @@
           <p:cNvPr id="4" name="Rectangle 3">
             <a:extLst>
               <a:ext uri="{FF2B5EF4-FFF2-40B4-BE49-F238E27FC236}">
-                <a16:creationId xmlns:a16="http://schemas.microsoft.com/office/drawing/2014/main" xmlns="" id="{BEAB10B3-74A6-4337-BD4C-C747B3A40788}"/>
+                <a16:creationId xmlns="" xmlns:a16="http://schemas.microsoft.com/office/drawing/2014/main" id="{BEAB10B3-74A6-4337-BD4C-C747B3A40788}"/>
               </a:ext>
             </a:extLst>
           </p:cNvPr>
@@ -6780,7 +7470,7 @@
           <p:cNvPr id="5" name="Rectangle 4">
             <a:extLst>
               <a:ext uri="{FF2B5EF4-FFF2-40B4-BE49-F238E27FC236}">
-                <a16:creationId xmlns:a16="http://schemas.microsoft.com/office/drawing/2014/main" xmlns="" id="{6F4BACC1-A20A-4997-8C50-E7C376D47B4D}"/>
+                <a16:creationId xmlns="" xmlns:a16="http://schemas.microsoft.com/office/drawing/2014/main" id="{6F4BACC1-A20A-4997-8C50-E7C376D47B4D}"/>
               </a:ext>
             </a:extLst>
           </p:cNvPr>
@@ -6843,7 +7533,7 @@
           <p:cNvPr id="7" name="Connector: Elbow 6">
             <a:extLst>
               <a:ext uri="{FF2B5EF4-FFF2-40B4-BE49-F238E27FC236}">
-                <a16:creationId xmlns:a16="http://schemas.microsoft.com/office/drawing/2014/main" xmlns="" id="{53260257-8C45-4C2E-B87D-8456DF9805B9}"/>
+                <a16:creationId xmlns="" xmlns:a16="http://schemas.microsoft.com/office/drawing/2014/main" id="{53260257-8C45-4C2E-B87D-8456DF9805B9}"/>
               </a:ext>
             </a:extLst>
           </p:cNvPr>
@@ -6889,7 +7579,7 @@
           <p:cNvPr id="17" name="Connector: Elbow 16">
             <a:extLst>
               <a:ext uri="{FF2B5EF4-FFF2-40B4-BE49-F238E27FC236}">
-                <a16:creationId xmlns:a16="http://schemas.microsoft.com/office/drawing/2014/main" xmlns="" id="{3F48239D-1ADB-4A1B-8F4F-1899FF5A8138}"/>
+                <a16:creationId xmlns="" xmlns:a16="http://schemas.microsoft.com/office/drawing/2014/main" id="{3F48239D-1ADB-4A1B-8F4F-1899FF5A8138}"/>
               </a:ext>
             </a:extLst>
           </p:cNvPr>
@@ -6932,7 +7622,7 @@
           <p:cNvPr id="40" name="Rectangle 39">
             <a:extLst>
               <a:ext uri="{FF2B5EF4-FFF2-40B4-BE49-F238E27FC236}">
-                <a16:creationId xmlns:a16="http://schemas.microsoft.com/office/drawing/2014/main" xmlns="" id="{179CC4DA-78CB-428B-B8AF-AF0272B5F844}"/>
+                <a16:creationId xmlns="" xmlns:a16="http://schemas.microsoft.com/office/drawing/2014/main" id="{179CC4DA-78CB-428B-B8AF-AF0272B5F844}"/>
               </a:ext>
             </a:extLst>
           </p:cNvPr>
@@ -6995,7 +7685,7 @@
           <p:cNvPr id="41" name="Rectangle 40">
             <a:extLst>
               <a:ext uri="{FF2B5EF4-FFF2-40B4-BE49-F238E27FC236}">
-                <a16:creationId xmlns:a16="http://schemas.microsoft.com/office/drawing/2014/main" xmlns="" id="{47E3F4DF-73C6-4F84-87A9-F71FE55F6DC5}"/>
+                <a16:creationId xmlns="" xmlns:a16="http://schemas.microsoft.com/office/drawing/2014/main" id="{47E3F4DF-73C6-4F84-87A9-F71FE55F6DC5}"/>
               </a:ext>
             </a:extLst>
           </p:cNvPr>
@@ -7058,7 +7748,7 @@
           <p:cNvPr id="42" name="Connector: Elbow 41">
             <a:extLst>
               <a:ext uri="{FF2B5EF4-FFF2-40B4-BE49-F238E27FC236}">
-                <a16:creationId xmlns:a16="http://schemas.microsoft.com/office/drawing/2014/main" xmlns="" id="{AB6EF1D0-8B87-48F3-8E28-FF3B19C25365}"/>
+                <a16:creationId xmlns="" xmlns:a16="http://schemas.microsoft.com/office/drawing/2014/main" id="{AB6EF1D0-8B87-48F3-8E28-FF3B19C25365}"/>
               </a:ext>
             </a:extLst>
           </p:cNvPr>
@@ -7100,7 +7790,7 @@
           <p:cNvPr id="45" name="Connector: Elbow 44">
             <a:extLst>
               <a:ext uri="{FF2B5EF4-FFF2-40B4-BE49-F238E27FC236}">
-                <a16:creationId xmlns:a16="http://schemas.microsoft.com/office/drawing/2014/main" xmlns="" id="{3F68FB00-90E7-4BC1-9110-2152CE9454A9}"/>
+                <a16:creationId xmlns="" xmlns:a16="http://schemas.microsoft.com/office/drawing/2014/main" id="{3F68FB00-90E7-4BC1-9110-2152CE9454A9}"/>
               </a:ext>
             </a:extLst>
           </p:cNvPr>
@@ -7160,114 +7850,6 @@
 </p:sld>
 </file>
 
-<file path=ppt/slides/slide8.xml><?xml version="1.0" encoding="utf-8"?>
-<p:sld xmlns:a="http://schemas.openxmlformats.org/drawingml/2006/main" xmlns:r="http://schemas.openxmlformats.org/officeDocument/2006/relationships" xmlns:p="http://schemas.openxmlformats.org/presentationml/2006/main">
-  <p:cSld>
-    <p:spTree>
-      <p:nvGrpSpPr>
-        <p:cNvPr id="1" name=""/>
-        <p:cNvGrpSpPr/>
-        <p:nvPr/>
-      </p:nvGrpSpPr>
-      <p:grpSpPr>
-        <a:xfrm>
-          <a:off x="0" y="0"/>
-          <a:ext cx="0" cy="0"/>
-          <a:chOff x="0" y="0"/>
-          <a:chExt cx="0" cy="0"/>
-        </a:xfrm>
-      </p:grpSpPr>
-      <p:sp>
-        <p:nvSpPr>
-          <p:cNvPr id="2" name="Title 1">
-            <a:extLst>
-              <a:ext uri="{FF2B5EF4-FFF2-40B4-BE49-F238E27FC236}">
-                <a16:creationId xmlns:a16="http://schemas.microsoft.com/office/drawing/2014/main" xmlns="" id="{6319BB65-3B68-4164-B74A-EDFAEC25D32D}"/>
-              </a:ext>
-            </a:extLst>
-          </p:cNvPr>
-          <p:cNvSpPr>
-            <a:spLocks noGrp="1"/>
-          </p:cNvSpPr>
-          <p:nvPr>
-            <p:ph type="title"/>
-          </p:nvPr>
-        </p:nvSpPr>
-        <p:spPr/>
-        <p:txBody>
-          <a:bodyPr/>
-          <a:lstStyle/>
-          <a:p>
-            <a:endParaRPr lang="en-US" dirty="0"/>
-          </a:p>
-        </p:txBody>
-      </p:sp>
-      <p:sp>
-        <p:nvSpPr>
-          <p:cNvPr id="3" name="Content Placeholder 2">
-            <a:extLst>
-              <a:ext uri="{FF2B5EF4-FFF2-40B4-BE49-F238E27FC236}">
-                <a16:creationId xmlns:a16="http://schemas.microsoft.com/office/drawing/2014/main" xmlns="" id="{DD77E9E4-0954-434C-955E-5B4820BD17E8}"/>
-              </a:ext>
-            </a:extLst>
-          </p:cNvPr>
-          <p:cNvSpPr>
-            <a:spLocks noGrp="1"/>
-          </p:cNvSpPr>
-          <p:nvPr>
-            <p:ph idx="1"/>
-          </p:nvPr>
-        </p:nvSpPr>
-        <p:spPr/>
-        <p:txBody>
-          <a:bodyPr/>
-          <a:lstStyle/>
-          <a:p>
-            <a:r>
-              <a:rPr lang="en-SG" dirty="0"/>
-              <a:t>Java API (lib) to index and search in file-based database</a:t>
-            </a:r>
-          </a:p>
-          <a:p>
-            <a:pPr lvl="1"/>
-            <a:r>
-              <a:rPr lang="en-SG" dirty="0"/>
-              <a:t>Lucene? </a:t>
-            </a:r>
-          </a:p>
-          <a:p>
-            <a:r>
-              <a:rPr lang="en-US" dirty="0" err="1" smtClean="0"/>
-              <a:t>Mapdb</a:t>
-            </a:r>
-            <a:r>
-              <a:rPr lang="en-US" smtClean="0"/>
-              <a:t> version 2</a:t>
-            </a:r>
-            <a:endParaRPr lang="en-US" dirty="0"/>
-          </a:p>
-        </p:txBody>
-      </p:sp>
-    </p:spTree>
-    <p:extLst>
-      <p:ext uri="{BB962C8B-B14F-4D97-AF65-F5344CB8AC3E}">
-        <p14:creationId xmlns:p14="http://schemas.microsoft.com/office/powerpoint/2010/main" val="2650207242"/>
-      </p:ext>
-    </p:extLst>
-  </p:cSld>
-  <p:clrMapOvr>
-    <a:masterClrMapping/>
-  </p:clrMapOvr>
-  <p:timing>
-    <p:tnLst>
-      <p:par>
-        <p:cTn id="1" dur="indefinite" restart="never" nodeType="tmRoot"/>
-      </p:par>
-    </p:tnLst>
-  </p:timing>
-</p:sld>
-</file>
-
 <file path=ppt/slides/slide9.xml><?xml version="1.0" encoding="utf-8"?>
 <p:sld xmlns:a="http://schemas.openxmlformats.org/drawingml/2006/main" xmlns:r="http://schemas.openxmlformats.org/officeDocument/2006/relationships" xmlns:p="http://schemas.openxmlformats.org/presentationml/2006/main">
   <p:cSld>
@@ -7287,518 +7869,79 @@
       </p:grpSpPr>
       <p:sp>
         <p:nvSpPr>
-          <p:cNvPr id="4" name="Rectangle 3">
-            <a:extLst>
-              <a:ext uri="{FF2B5EF4-FFF2-40B4-BE49-F238E27FC236}">
-                <a16:creationId xmlns:a16="http://schemas.microsoft.com/office/drawing/2014/main" xmlns="" id="{ADD27894-02D3-4F7D-8500-723F9874850D}"/>
-              </a:ext>
-            </a:extLst>
-          </p:cNvPr>
-          <p:cNvSpPr/>
-          <p:nvPr/>
-        </p:nvSpPr>
-        <p:spPr>
-          <a:xfrm>
-            <a:off x="5157227" y="1158660"/>
-            <a:ext cx="2831909" cy="3972140"/>
-          </a:xfrm>
-          <a:prstGeom prst="rect">
-            <a:avLst/>
-          </a:prstGeom>
-          <a:noFill/>
-        </p:spPr>
-        <p:style>
-          <a:lnRef idx="2">
-            <a:schemeClr val="accent1">
-              <a:shade val="50000"/>
-            </a:schemeClr>
-          </a:lnRef>
-          <a:fillRef idx="1">
-            <a:schemeClr val="accent1"/>
-          </a:fillRef>
-          <a:effectRef idx="0">
-            <a:schemeClr val="accent1"/>
-          </a:effectRef>
-          <a:fontRef idx="minor">
-            <a:schemeClr val="lt1"/>
-          </a:fontRef>
-        </p:style>
-        <p:txBody>
-          <a:bodyPr rtlCol="0" anchor="ctr"/>
-          <a:lstStyle/>
-          <a:p>
-            <a:r>
-              <a:rPr lang="en-SG" dirty="0">
-                <a:solidFill>
-                  <a:schemeClr val="tx1"/>
-                </a:solidFill>
-              </a:rPr>
-              <a:t>Trace Node:</a:t>
-            </a:r>
-          </a:p>
-          <a:p>
-            <a:pPr marL="285750" indent="-285750">
-              <a:buFontTx/>
-              <a:buChar char="-"/>
-            </a:pPr>
-            <a:r>
-              <a:rPr lang="en-SG" dirty="0">
-                <a:solidFill>
-                  <a:schemeClr val="tx1"/>
-                </a:solidFill>
-              </a:rPr>
-              <a:t>trace node id (</a:t>
-            </a:r>
-            <a:r>
-              <a:rPr lang="en-SG" dirty="0" err="1">
-                <a:solidFill>
-                  <a:schemeClr val="tx1"/>
-                </a:solidFill>
-              </a:rPr>
-              <a:t>block_file_path+seq_id</a:t>
-            </a:r>
-            <a:r>
-              <a:rPr lang="en-SG" dirty="0">
-                <a:solidFill>
-                  <a:schemeClr val="tx1"/>
-                </a:solidFill>
-              </a:rPr>
-              <a:t>)</a:t>
-            </a:r>
-          </a:p>
-          <a:p>
-            <a:pPr marL="285750" indent="-285750">
-              <a:buFontTx/>
-              <a:buChar char="-"/>
-            </a:pPr>
-            <a:endParaRPr lang="en-SG" dirty="0">
-              <a:solidFill>
-                <a:schemeClr val="tx1"/>
-              </a:solidFill>
-            </a:endParaRPr>
-          </a:p>
-          <a:p>
-            <a:pPr marL="342900" indent="-342900">
-              <a:buAutoNum type="arabicPeriod"/>
-            </a:pPr>
-            <a:r>
-              <a:rPr lang="en-SG" dirty="0">
-                <a:solidFill>
-                  <a:schemeClr val="tx1"/>
-                </a:solidFill>
-              </a:rPr>
-              <a:t>ref to read/written variables</a:t>
-            </a:r>
-          </a:p>
-          <a:p>
-            <a:pPr marL="342900" indent="-342900">
-              <a:buAutoNum type="arabicPeriod"/>
-            </a:pPr>
-            <a:r>
-              <a:rPr lang="en-SG" dirty="0">
-                <a:solidFill>
-                  <a:schemeClr val="tx1"/>
-                </a:solidFill>
-              </a:rPr>
-              <a:t>Ref to data/control dependency</a:t>
-            </a:r>
-          </a:p>
-          <a:p>
-            <a:pPr marL="342900" indent="-342900">
-              <a:buAutoNum type="arabicPeriod"/>
-            </a:pPr>
-            <a:r>
-              <a:rPr lang="en-SG" dirty="0">
-                <a:solidFill>
-                  <a:schemeClr val="tx1"/>
-                </a:solidFill>
-              </a:rPr>
-              <a:t>Ref to Hierarchical Children (invocation/loop children)</a:t>
-            </a:r>
-            <a:br>
-              <a:rPr lang="en-SG" dirty="0">
-                <a:solidFill>
-                  <a:schemeClr val="tx1"/>
-                </a:solidFill>
-              </a:rPr>
-            </a:br>
-            <a:endParaRPr lang="en-US" dirty="0">
-              <a:solidFill>
-                <a:schemeClr val="tx1"/>
-              </a:solidFill>
-            </a:endParaRPr>
-          </a:p>
-        </p:txBody>
-      </p:sp>
-      <p:sp>
-        <p:nvSpPr>
-          <p:cNvPr id="5" name="Rectangle 4">
-            <a:extLst>
-              <a:ext uri="{FF2B5EF4-FFF2-40B4-BE49-F238E27FC236}">
-                <a16:creationId xmlns:a16="http://schemas.microsoft.com/office/drawing/2014/main" xmlns="" id="{E3C7068E-D01A-4E3E-B8C1-55FF8AFF3342}"/>
-              </a:ext>
-            </a:extLst>
-          </p:cNvPr>
-          <p:cNvSpPr/>
-          <p:nvPr/>
-        </p:nvSpPr>
-        <p:spPr>
-          <a:xfrm>
-            <a:off x="9477828" y="2091989"/>
-            <a:ext cx="1724054" cy="378415"/>
-          </a:xfrm>
-          <a:prstGeom prst="rect">
-            <a:avLst/>
-          </a:prstGeom>
-          <a:noFill/>
-        </p:spPr>
-        <p:style>
-          <a:lnRef idx="2">
-            <a:schemeClr val="accent1">
-              <a:shade val="50000"/>
-            </a:schemeClr>
-          </a:lnRef>
-          <a:fillRef idx="1">
-            <a:schemeClr val="accent1"/>
-          </a:fillRef>
-          <a:effectRef idx="0">
-            <a:schemeClr val="accent1"/>
-          </a:effectRef>
-          <a:fontRef idx="minor">
-            <a:schemeClr val="lt1"/>
-          </a:fontRef>
-        </p:style>
-        <p:txBody>
-          <a:bodyPr rot="0" spcFirstLastPara="0" vertOverflow="overflow" horzOverflow="overflow" vert="horz" wrap="square" lIns="91440" tIns="45720" rIns="91440" bIns="45720" numCol="1" spcCol="0" rtlCol="0" fromWordArt="0" anchor="ctr" anchorCtr="0" forceAA="0" compatLnSpc="1">
-            <a:prstTxWarp prst="textNoShape">
-              <a:avLst/>
-            </a:prstTxWarp>
-            <a:noAutofit/>
-          </a:bodyPr>
-          <a:lstStyle/>
-          <a:p>
-            <a:r>
-              <a:rPr lang="en-SG" dirty="0">
-                <a:solidFill>
-                  <a:schemeClr val="tx1"/>
-                </a:solidFill>
-              </a:rPr>
-              <a:t>Variable File?</a:t>
-            </a:r>
-            <a:endParaRPr lang="en-US" dirty="0">
-              <a:solidFill>
-                <a:schemeClr val="tx1"/>
-              </a:solidFill>
-            </a:endParaRPr>
-          </a:p>
-        </p:txBody>
-      </p:sp>
-      <p:cxnSp>
-        <p:nvCxnSpPr>
-          <p:cNvPr id="6" name="Connector: Elbow 5">
-            <a:extLst>
-              <a:ext uri="{FF2B5EF4-FFF2-40B4-BE49-F238E27FC236}">
-                <a16:creationId xmlns:a16="http://schemas.microsoft.com/office/drawing/2014/main" xmlns="" id="{1A85D5D1-EC86-416B-82E8-FC836BF31A96}"/>
-              </a:ext>
-            </a:extLst>
-          </p:cNvPr>
-          <p:cNvCxnSpPr>
-            <a:cxnSpLocks/>
-            <a:stCxn id="4" idx="1"/>
-            <a:endCxn id="4" idx="0"/>
-          </p:cNvCxnSpPr>
-          <p:nvPr/>
-        </p:nvCxnSpPr>
-        <p:spPr>
-          <a:xfrm rot="10800000" flipH="1">
-            <a:off x="5157226" y="1158660"/>
-            <a:ext cx="1415955" cy="1986070"/>
-          </a:xfrm>
-          <a:prstGeom prst="bentConnector4">
-            <a:avLst>
-              <a:gd name="adj1" fmla="val -16145"/>
-              <a:gd name="adj2" fmla="val 111510"/>
-            </a:avLst>
-          </a:prstGeom>
-          <a:ln>
-            <a:tailEnd type="triangle" w="lg" len="lg"/>
-          </a:ln>
-        </p:spPr>
-        <p:style>
-          <a:lnRef idx="1">
-            <a:schemeClr val="accent1"/>
-          </a:lnRef>
-          <a:fillRef idx="0">
-            <a:schemeClr val="accent1"/>
-          </a:fillRef>
-          <a:effectRef idx="0">
-            <a:schemeClr val="accent1"/>
-          </a:effectRef>
-          <a:fontRef idx="minor">
-            <a:schemeClr val="tx1"/>
-          </a:fontRef>
-        </p:style>
-      </p:cxnSp>
-      <p:cxnSp>
-        <p:nvCxnSpPr>
-          <p:cNvPr id="7" name="Connector: Elbow 6">
-            <a:extLst>
-              <a:ext uri="{FF2B5EF4-FFF2-40B4-BE49-F238E27FC236}">
-                <a16:creationId xmlns:a16="http://schemas.microsoft.com/office/drawing/2014/main" xmlns="" id="{72A2CCAF-75C7-40E9-A607-135FCD5BDE61}"/>
-              </a:ext>
-            </a:extLst>
-          </p:cNvPr>
-          <p:cNvCxnSpPr>
-            <a:cxnSpLocks/>
-            <a:stCxn id="4" idx="3"/>
-            <a:endCxn id="5" idx="1"/>
-          </p:cNvCxnSpPr>
-          <p:nvPr/>
-        </p:nvCxnSpPr>
-        <p:spPr>
-          <a:xfrm flipV="1">
-            <a:off x="7989136" y="2281197"/>
-            <a:ext cx="1488692" cy="863533"/>
-          </a:xfrm>
-          <a:prstGeom prst="bentConnector3">
-            <a:avLst/>
-          </a:prstGeom>
-          <a:ln>
-            <a:tailEnd type="triangle"/>
-          </a:ln>
-        </p:spPr>
-        <p:style>
-          <a:lnRef idx="1">
-            <a:schemeClr val="accent1"/>
-          </a:lnRef>
-          <a:fillRef idx="0">
-            <a:schemeClr val="accent1"/>
-          </a:fillRef>
-          <a:effectRef idx="0">
-            <a:schemeClr val="accent1"/>
-          </a:effectRef>
-          <a:fontRef idx="minor">
-            <a:schemeClr val="tx1"/>
-          </a:fontRef>
-        </p:style>
-      </p:cxnSp>
-      <p:sp>
-        <p:nvSpPr>
-          <p:cNvPr id="8" name="Rectangle 7">
-            <a:extLst>
-              <a:ext uri="{FF2B5EF4-FFF2-40B4-BE49-F238E27FC236}">
-                <a16:creationId xmlns:a16="http://schemas.microsoft.com/office/drawing/2014/main" xmlns="" id="{81E41073-32BA-4270-B734-E8DD14034463}"/>
-              </a:ext>
-            </a:extLst>
-          </p:cNvPr>
-          <p:cNvSpPr/>
-          <p:nvPr/>
-        </p:nvSpPr>
-        <p:spPr>
-          <a:xfrm>
-            <a:off x="1306340" y="3589879"/>
-            <a:ext cx="1724054" cy="671587"/>
-          </a:xfrm>
-          <a:prstGeom prst="rect">
-            <a:avLst/>
-          </a:prstGeom>
-          <a:noFill/>
-        </p:spPr>
-        <p:style>
-          <a:lnRef idx="2">
-            <a:schemeClr val="accent1">
-              <a:shade val="50000"/>
-            </a:schemeClr>
-          </a:lnRef>
-          <a:fillRef idx="1">
-            <a:schemeClr val="accent1"/>
-          </a:fillRef>
-          <a:effectRef idx="0">
-            <a:schemeClr val="accent1"/>
-          </a:effectRef>
-          <a:fontRef idx="minor">
-            <a:schemeClr val="lt1"/>
-          </a:fontRef>
-        </p:style>
-        <p:txBody>
-          <a:bodyPr rot="0" spcFirstLastPara="0" vertOverflow="overflow" horzOverflow="overflow" vert="horz" wrap="square" lIns="91440" tIns="45720" rIns="91440" bIns="45720" numCol="1" spcCol="0" rtlCol="0" fromWordArt="0" anchor="ctr" anchorCtr="0" forceAA="0" compatLnSpc="1">
-            <a:prstTxWarp prst="textNoShape">
-              <a:avLst/>
-            </a:prstTxWarp>
-            <a:noAutofit/>
-          </a:bodyPr>
-          <a:lstStyle/>
-          <a:p>
-            <a:r>
-              <a:rPr lang="en-SG" dirty="0">
-                <a:solidFill>
-                  <a:schemeClr val="tx1"/>
-                </a:solidFill>
-              </a:rPr>
-              <a:t>Trace Header file (execution)</a:t>
-            </a:r>
-            <a:endParaRPr lang="en-US" dirty="0">
-              <a:solidFill>
-                <a:schemeClr val="tx1"/>
-              </a:solidFill>
-            </a:endParaRPr>
-          </a:p>
-        </p:txBody>
-      </p:sp>
-      <p:sp>
-        <p:nvSpPr>
-          <p:cNvPr id="9" name="Rectangle 8">
-            <a:extLst>
-              <a:ext uri="{FF2B5EF4-FFF2-40B4-BE49-F238E27FC236}">
-                <a16:creationId xmlns:a16="http://schemas.microsoft.com/office/drawing/2014/main" xmlns="" id="{41CFAC0D-FF55-41D2-8215-966C18F9A802}"/>
-              </a:ext>
-            </a:extLst>
-          </p:cNvPr>
-          <p:cNvSpPr/>
-          <p:nvPr/>
-        </p:nvSpPr>
-        <p:spPr>
-          <a:xfrm>
-            <a:off x="1306340" y="1362237"/>
-            <a:ext cx="1724054" cy="416257"/>
-          </a:xfrm>
-          <a:prstGeom prst="rect">
-            <a:avLst/>
-          </a:prstGeom>
-          <a:noFill/>
-        </p:spPr>
-        <p:style>
-          <a:lnRef idx="2">
-            <a:schemeClr val="accent1">
-              <a:shade val="50000"/>
-            </a:schemeClr>
-          </a:lnRef>
-          <a:fillRef idx="1">
-            <a:schemeClr val="accent1"/>
-          </a:fillRef>
-          <a:effectRef idx="0">
-            <a:schemeClr val="accent1"/>
-          </a:effectRef>
-          <a:fontRef idx="minor">
-            <a:schemeClr val="lt1"/>
-          </a:fontRef>
-        </p:style>
-        <p:txBody>
-          <a:bodyPr rot="0" spcFirstLastPara="0" vertOverflow="overflow" horzOverflow="overflow" vert="horz" wrap="square" lIns="91440" tIns="45720" rIns="91440" bIns="45720" numCol="1" spcCol="0" rtlCol="0" fromWordArt="0" anchor="ctr" anchorCtr="0" forceAA="0" compatLnSpc="1">
-            <a:prstTxWarp prst="textNoShape">
-              <a:avLst/>
-            </a:prstTxWarp>
-            <a:noAutofit/>
-          </a:bodyPr>
-          <a:lstStyle/>
-          <a:p>
-            <a:r>
-              <a:rPr lang="en-SG" dirty="0">
-                <a:solidFill>
-                  <a:schemeClr val="tx1"/>
-                </a:solidFill>
-              </a:rPr>
-              <a:t>Block File</a:t>
-            </a:r>
-            <a:endParaRPr lang="en-US" dirty="0">
-              <a:solidFill>
-                <a:schemeClr val="tx1"/>
-              </a:solidFill>
-            </a:endParaRPr>
-          </a:p>
-        </p:txBody>
-      </p:sp>
-      <p:cxnSp>
-        <p:nvCxnSpPr>
-          <p:cNvPr id="10" name="Connector: Elbow 9">
-            <a:extLst>
-              <a:ext uri="{FF2B5EF4-FFF2-40B4-BE49-F238E27FC236}">
-                <a16:creationId xmlns:a16="http://schemas.microsoft.com/office/drawing/2014/main" xmlns="" id="{12CA1A67-9A30-4B64-8A54-7B9115C60266}"/>
-              </a:ext>
-            </a:extLst>
-          </p:cNvPr>
-          <p:cNvCxnSpPr>
-            <a:cxnSpLocks/>
-            <a:stCxn id="9" idx="2"/>
-          </p:cNvCxnSpPr>
-          <p:nvPr/>
-        </p:nvCxnSpPr>
-        <p:spPr>
-          <a:xfrm rot="16200000" flipH="1">
-            <a:off x="2895277" y="1051584"/>
-            <a:ext cx="1522338" cy="2976158"/>
-          </a:xfrm>
-          <a:prstGeom prst="bentConnector2">
-            <a:avLst/>
-          </a:prstGeom>
-          <a:ln>
-            <a:tailEnd type="triangle" w="lg" len="lg"/>
-          </a:ln>
-        </p:spPr>
-        <p:style>
-          <a:lnRef idx="1">
-            <a:schemeClr val="accent1"/>
-          </a:lnRef>
-          <a:fillRef idx="0">
-            <a:schemeClr val="accent1"/>
-          </a:fillRef>
-          <a:effectRef idx="0">
-            <a:schemeClr val="accent1"/>
-          </a:effectRef>
-          <a:fontRef idx="minor">
-            <a:schemeClr val="tx1"/>
-          </a:fontRef>
-        </p:style>
-      </p:cxnSp>
-      <p:cxnSp>
-        <p:nvCxnSpPr>
-          <p:cNvPr id="11" name="Connector: Elbow 10">
-            <a:extLst>
-              <a:ext uri="{FF2B5EF4-FFF2-40B4-BE49-F238E27FC236}">
-                <a16:creationId xmlns:a16="http://schemas.microsoft.com/office/drawing/2014/main" xmlns="" id="{EC0728E9-347A-43CF-B5F4-1645B132EABB}"/>
-              </a:ext>
-            </a:extLst>
-          </p:cNvPr>
-          <p:cNvCxnSpPr>
-            <a:cxnSpLocks/>
-            <a:stCxn id="8" idx="1"/>
-            <a:endCxn id="9" idx="1"/>
-          </p:cNvCxnSpPr>
-          <p:nvPr/>
-        </p:nvCxnSpPr>
-        <p:spPr>
-          <a:xfrm rot="10800000">
-            <a:off x="1306340" y="1570367"/>
-            <a:ext cx="12700" cy="2355307"/>
-          </a:xfrm>
-          <a:prstGeom prst="bentConnector3">
-            <a:avLst>
-              <a:gd name="adj1" fmla="val 6371425"/>
-            </a:avLst>
-          </a:prstGeom>
-          <a:ln>
-            <a:tailEnd type="triangle" w="lg" len="lg"/>
-          </a:ln>
-        </p:spPr>
-        <p:style>
-          <a:lnRef idx="1">
-            <a:schemeClr val="accent1"/>
-          </a:lnRef>
-          <a:fillRef idx="0">
-            <a:schemeClr val="accent1"/>
-          </a:fillRef>
-          <a:effectRef idx="0">
-            <a:schemeClr val="accent1"/>
-          </a:effectRef>
-          <a:fontRef idx="minor">
-            <a:schemeClr val="tx1"/>
-          </a:fontRef>
-        </p:style>
-      </p:cxnSp>
+          <p:cNvPr id="2" name="Title 1">
+            <a:extLst>
+              <a:ext uri="{FF2B5EF4-FFF2-40B4-BE49-F238E27FC236}">
+                <a16:creationId xmlns="" xmlns:a16="http://schemas.microsoft.com/office/drawing/2014/main" id="{6319BB65-3B68-4164-B74A-EDFAEC25D32D}"/>
+              </a:ext>
+            </a:extLst>
+          </p:cNvPr>
+          <p:cNvSpPr>
+            <a:spLocks noGrp="1"/>
+          </p:cNvSpPr>
+          <p:nvPr>
+            <p:ph type="title"/>
+          </p:nvPr>
+        </p:nvSpPr>
+        <p:spPr/>
+        <p:txBody>
+          <a:bodyPr/>
+          <a:lstStyle/>
+          <a:p>
+            <a:endParaRPr lang="en-US" dirty="0"/>
+          </a:p>
+        </p:txBody>
+      </p:sp>
+      <p:sp>
+        <p:nvSpPr>
+          <p:cNvPr id="3" name="Content Placeholder 2">
+            <a:extLst>
+              <a:ext uri="{FF2B5EF4-FFF2-40B4-BE49-F238E27FC236}">
+                <a16:creationId xmlns="" xmlns:a16="http://schemas.microsoft.com/office/drawing/2014/main" id="{DD77E9E4-0954-434C-955E-5B4820BD17E8}"/>
+              </a:ext>
+            </a:extLst>
+          </p:cNvPr>
+          <p:cNvSpPr>
+            <a:spLocks noGrp="1"/>
+          </p:cNvSpPr>
+          <p:nvPr>
+            <p:ph idx="1"/>
+          </p:nvPr>
+        </p:nvSpPr>
+        <p:spPr/>
+        <p:txBody>
+          <a:bodyPr/>
+          <a:lstStyle/>
+          <a:p>
+            <a:r>
+              <a:rPr lang="en-SG" dirty="0"/>
+              <a:t>Java API (lib) to index and search in file-based database</a:t>
+            </a:r>
+          </a:p>
+          <a:p>
+            <a:pPr lvl="1"/>
+            <a:r>
+              <a:rPr lang="en-SG" dirty="0"/>
+              <a:t>Lucene? </a:t>
+            </a:r>
+          </a:p>
+          <a:p>
+            <a:r>
+              <a:rPr lang="en-US" dirty="0" err="1" smtClean="0"/>
+              <a:t>Mapdb</a:t>
+            </a:r>
+            <a:r>
+              <a:rPr lang="en-US" smtClean="0"/>
+              <a:t> version 2</a:t>
+            </a:r>
+            <a:endParaRPr lang="en-US" dirty="0"/>
+          </a:p>
+        </p:txBody>
+      </p:sp>
     </p:spTree>
     <p:extLst>
       <p:ext uri="{BB962C8B-B14F-4D97-AF65-F5344CB8AC3E}">
-        <p14:creationId xmlns:p14="http://schemas.microsoft.com/office/powerpoint/2010/main" val="3444824109"/>
+        <p14:creationId xmlns:p14="http://schemas.microsoft.com/office/powerpoint/2010/main" val="2650207242"/>
       </p:ext>
     </p:extLst>
   </p:cSld>
@@ -8104,7 +8247,7 @@
   <a:extraClrSchemeLst/>
   <a:extLst>
     <a:ext uri="{05A4C25C-085E-4340-85A3-A5531E510DB2}">
-      <thm15:themeFamily xmlns:thm15="http://schemas.microsoft.com/office/thememl/2012/main" xmlns="" name="Office Theme" id="{62F939B6-93AF-4DB8-9C6B-D6C7DFDC589F}" vid="{4A3C46E8-61CC-4603-A589-7422A47A8E4A}"/>
+      <thm15:themeFamily xmlns="" xmlns:thm15="http://schemas.microsoft.com/office/thememl/2012/main" name="Office Theme" id="{62F939B6-93AF-4DB8-9C6B-D6C7DFDC589F}" vid="{4A3C46E8-61CC-4603-A589-7422A47A8E4A}"/>
     </a:ext>
   </a:extLst>
 </a:theme>

</xml_diff>